<commit_message>
add some new charts
</commit_message>
<xml_diff>
--- a/Session02.pptx
+++ b/Session02.pptx
@@ -268,7 +268,7 @@
           <a:p>
             <a:fld id="{CE4EEE66-3C1A-F640-96BA-2DDC0EDF8D51}" type="datetimeFigureOut">
               <a:rPr lang="en-US" smtClean="0"/>
-              <a:t>3/27/20</a:t>
+              <a:t>3/30/20</a:t>
             </a:fld>
             <a:endParaRPr lang="en-US"/>
           </a:p>
@@ -466,7 +466,7 @@
           <a:p>
             <a:fld id="{CE4EEE66-3C1A-F640-96BA-2DDC0EDF8D51}" type="datetimeFigureOut">
               <a:rPr lang="en-US" smtClean="0"/>
-              <a:t>3/27/20</a:t>
+              <a:t>3/30/20</a:t>
             </a:fld>
             <a:endParaRPr lang="en-US"/>
           </a:p>
@@ -674,7 +674,7 @@
           <a:p>
             <a:fld id="{CE4EEE66-3C1A-F640-96BA-2DDC0EDF8D51}" type="datetimeFigureOut">
               <a:rPr lang="en-US" smtClean="0"/>
-              <a:t>3/27/20</a:t>
+              <a:t>3/30/20</a:t>
             </a:fld>
             <a:endParaRPr lang="en-US"/>
           </a:p>
@@ -872,7 +872,7 @@
           <a:p>
             <a:fld id="{CE4EEE66-3C1A-F640-96BA-2DDC0EDF8D51}" type="datetimeFigureOut">
               <a:rPr lang="en-US" smtClean="0"/>
-              <a:t>3/27/20</a:t>
+              <a:t>3/30/20</a:t>
             </a:fld>
             <a:endParaRPr lang="en-US"/>
           </a:p>
@@ -1147,7 +1147,7 @@
           <a:p>
             <a:fld id="{CE4EEE66-3C1A-F640-96BA-2DDC0EDF8D51}" type="datetimeFigureOut">
               <a:rPr lang="en-US" smtClean="0"/>
-              <a:t>3/27/20</a:t>
+              <a:t>3/30/20</a:t>
             </a:fld>
             <a:endParaRPr lang="en-US"/>
           </a:p>
@@ -1412,7 +1412,7 @@
           <a:p>
             <a:fld id="{CE4EEE66-3C1A-F640-96BA-2DDC0EDF8D51}" type="datetimeFigureOut">
               <a:rPr lang="en-US" smtClean="0"/>
-              <a:t>3/27/20</a:t>
+              <a:t>3/30/20</a:t>
             </a:fld>
             <a:endParaRPr lang="en-US"/>
           </a:p>
@@ -1824,7 +1824,7 @@
           <a:p>
             <a:fld id="{CE4EEE66-3C1A-F640-96BA-2DDC0EDF8D51}" type="datetimeFigureOut">
               <a:rPr lang="en-US" smtClean="0"/>
-              <a:t>3/27/20</a:t>
+              <a:t>3/30/20</a:t>
             </a:fld>
             <a:endParaRPr lang="en-US"/>
           </a:p>
@@ -1965,7 +1965,7 @@
           <a:p>
             <a:fld id="{CE4EEE66-3C1A-F640-96BA-2DDC0EDF8D51}" type="datetimeFigureOut">
               <a:rPr lang="en-US" smtClean="0"/>
-              <a:t>3/27/20</a:t>
+              <a:t>3/30/20</a:t>
             </a:fld>
             <a:endParaRPr lang="en-US"/>
           </a:p>
@@ -2078,7 +2078,7 @@
           <a:p>
             <a:fld id="{CE4EEE66-3C1A-F640-96BA-2DDC0EDF8D51}" type="datetimeFigureOut">
               <a:rPr lang="en-US" smtClean="0"/>
-              <a:t>3/27/20</a:t>
+              <a:t>3/30/20</a:t>
             </a:fld>
             <a:endParaRPr lang="en-US"/>
           </a:p>
@@ -2389,7 +2389,7 @@
           <a:p>
             <a:fld id="{CE4EEE66-3C1A-F640-96BA-2DDC0EDF8D51}" type="datetimeFigureOut">
               <a:rPr lang="en-US" smtClean="0"/>
-              <a:t>3/27/20</a:t>
+              <a:t>3/30/20</a:t>
             </a:fld>
             <a:endParaRPr lang="en-US"/>
           </a:p>
@@ -2677,7 +2677,7 @@
           <a:p>
             <a:fld id="{CE4EEE66-3C1A-F640-96BA-2DDC0EDF8D51}" type="datetimeFigureOut">
               <a:rPr lang="en-US" smtClean="0"/>
-              <a:t>3/27/20</a:t>
+              <a:t>3/30/20</a:t>
             </a:fld>
             <a:endParaRPr lang="en-US"/>
           </a:p>
@@ -2918,7 +2918,7 @@
           <a:p>
             <a:fld id="{CE4EEE66-3C1A-F640-96BA-2DDC0EDF8D51}" type="datetimeFigureOut">
               <a:rPr lang="en-US" smtClean="0"/>
-              <a:t>3/27/20</a:t>
+              <a:t>3/30/20</a:t>
             </a:fld>
             <a:endParaRPr lang="en-US"/>
           </a:p>
@@ -3713,7 +3713,7 @@
             </a:pPr>
             <a:r>
               <a:rPr lang="en-US" dirty="0"/>
-              <a:t>It is open-source.</a:t>
+              <a:t>It serves as a frontend for graph neural network algorithms and can leverage popular deep learning frameworks as backend.</a:t>
             </a:r>
           </a:p>
           <a:p>
@@ -3730,7 +3730,7 @@
             </a:pPr>
             <a:r>
               <a:rPr lang="en-US" dirty="0"/>
-              <a:t>It serves as a frontend for graph neural network algorithms and can leverage popular deep learning frameworks as backend.</a:t>
+              <a:t>It is open-source.</a:t>
             </a:r>
           </a:p>
           <a:p>
@@ -3778,10 +3778,40 @@
       </p:sp>
       <p:pic>
         <p:nvPicPr>
-          <p:cNvPr id="1026" name="Picture 2" descr="DGL v0.4 architecture">
-            <a:extLst>
-              <a:ext uri="{FF2B5EF4-FFF2-40B4-BE49-F238E27FC236}">
-                <a16:creationId xmlns:a16="http://schemas.microsoft.com/office/drawing/2014/main" id="{8B3E7468-CA12-CD41-B645-1F7F0BB6A25A}"/>
+          <p:cNvPr id="6" name="Picture 5">
+            <a:extLst>
+              <a:ext uri="{FF2B5EF4-FFF2-40B4-BE49-F238E27FC236}">
+                <a16:creationId xmlns:a16="http://schemas.microsoft.com/office/drawing/2014/main" id="{00F722B3-F1D8-EC41-9F56-1FA64715E69D}"/>
+              </a:ext>
+            </a:extLst>
+          </p:cNvPr>
+          <p:cNvPicPr>
+            <a:picLocks noChangeAspect="1"/>
+          </p:cNvPicPr>
+          <p:nvPr/>
+        </p:nvPicPr>
+        <p:blipFill>
+          <a:blip r:embed="rId2"/>
+          <a:stretch>
+            <a:fillRect/>
+          </a:stretch>
+        </p:blipFill>
+        <p:spPr>
+          <a:xfrm>
+            <a:off x="6096000" y="934453"/>
+            <a:ext cx="5860418" cy="4215064"/>
+          </a:xfrm>
+          <a:prstGeom prst="rect">
+            <a:avLst/>
+          </a:prstGeom>
+        </p:spPr>
+      </p:pic>
+      <p:pic>
+        <p:nvPicPr>
+          <p:cNvPr id="1028" name="Picture 4" descr="Everything you need to know about TensorFlow 2.0 - Towards Data ...">
+            <a:extLst>
+              <a:ext uri="{FF2B5EF4-FFF2-40B4-BE49-F238E27FC236}">
+                <a16:creationId xmlns:a16="http://schemas.microsoft.com/office/drawing/2014/main" id="{91A6821F-ECCD-EA42-A2DC-215BF412A6BC}"/>
               </a:ext>
             </a:extLst>
           </p:cNvPr>
@@ -3791,7 +3821,7 @@
           <p:nvPr/>
         </p:nvPicPr>
         <p:blipFill>
-          <a:blip r:embed="rId2">
+          <a:blip r:embed="rId3">
             <a:extLst>
               <a:ext uri="{28A0092B-C50C-407E-A947-70E740481C1C}">
                 <a14:useLocalDpi xmlns:a14="http://schemas.microsoft.com/office/drawing/2010/main" val="0"/>
@@ -3805,8 +3835,8 @@
         </p:blipFill>
         <p:spPr bwMode="auto">
           <a:xfrm>
-            <a:off x="6096000" y="1219934"/>
-            <a:ext cx="5772912" cy="3502233"/>
+            <a:off x="6725653" y="4015562"/>
+            <a:ext cx="1941094" cy="634141"/>
           </a:xfrm>
           <a:prstGeom prst="rect">
             <a:avLst/>
@@ -4183,7 +4213,7 @@
         </p:blipFill>
         <p:spPr>
           <a:xfrm>
-            <a:off x="962525" y="1662948"/>
+            <a:off x="733925" y="1155356"/>
             <a:ext cx="10531186" cy="4547287"/>
           </a:xfrm>
           <a:prstGeom prst="rect">
@@ -4329,15 +4359,7 @@
             <a:pPr lvl="1"/>
             <a:r>
               <a:rPr lang="en-US" i="1" dirty="0"/>
-              <a:t>DGL graph </a:t>
-            </a:r>
-            <a:r>
-              <a:rPr lang="en-US" i="1" dirty="0" err="1"/>
-              <a:t>api</a:t>
-            </a:r>
-            <a:r>
-              <a:rPr lang="en-US" i="1" dirty="0"/>
-              <a:t> support all kinds of graphs.</a:t>
+              <a:t>DGL graph API support all kinds of graphs.</a:t>
             </a:r>
           </a:p>
           <a:p>
@@ -4411,7 +4433,7 @@
             </a:pPr>
             <a:r>
               <a:rPr lang="en-US" b="1" dirty="0"/>
-              <a:t>What if I do not even know Python?</a:t>
+              <a:t>I focused on a domain area.</a:t>
             </a:r>
           </a:p>
           <a:p>
@@ -4468,7 +4490,7 @@
         <p:spPr>
           <a:xfrm>
             <a:off x="977030" y="513567"/>
-            <a:ext cx="9181578" cy="1138773"/>
+            <a:ext cx="8142907" cy="861774"/>
           </a:xfrm>
           <a:prstGeom prst="rect">
             <a:avLst/>
@@ -4488,16 +4510,6 @@
           </a:p>
           <a:p>
             <a:endParaRPr lang="en-US" dirty="0"/>
-          </a:p>
-          <a:p>
-            <a:pPr marL="285750" indent="-285750">
-              <a:buFont typeface="Arial" panose="020B0604020202020204" pitchFamily="34" charset="0"/>
-              <a:buChar char="•"/>
-            </a:pPr>
-            <a:r>
-              <a:rPr lang="en-US" dirty="0"/>
-              <a:t>A lot dataset in real world is complicated and cannot be easily written as structure data.</a:t>
-            </a:r>
           </a:p>
         </p:txBody>
       </p:sp>
@@ -4522,7 +4534,7 @@
         </p:blipFill>
         <p:spPr>
           <a:xfrm>
-            <a:off x="841248" y="1815920"/>
+            <a:off x="7029879" y="1330269"/>
             <a:ext cx="1926336" cy="2351403"/>
           </a:xfrm>
           <a:prstGeom prst="rect">
@@ -4551,7 +4563,7 @@
         </p:blipFill>
         <p:spPr>
           <a:xfrm>
-            <a:off x="3476872" y="1815920"/>
+            <a:off x="9119937" y="1258077"/>
             <a:ext cx="2986224" cy="2429470"/>
           </a:xfrm>
           <a:prstGeom prst="rect">
@@ -4592,8 +4604,8 @@
         </p:blipFill>
         <p:spPr bwMode="auto">
           <a:xfrm>
-            <a:off x="7172383" y="1967401"/>
-            <a:ext cx="3519421" cy="2109215"/>
+            <a:off x="7267075" y="3741906"/>
+            <a:ext cx="4656220" cy="2790507"/>
           </a:xfrm>
           <a:prstGeom prst="rect">
             <a:avLst/>
@@ -4624,8 +4636,8 @@
         </p:nvSpPr>
         <p:spPr>
           <a:xfrm>
-            <a:off x="841248" y="4505156"/>
-            <a:ext cx="9181578" cy="1754326"/>
+            <a:off x="977029" y="1832543"/>
+            <a:ext cx="5231265" cy="3416320"/>
           </a:xfrm>
           <a:prstGeom prst="rect">
             <a:avLst/>
@@ -4644,27 +4656,7 @@
             </a:pPr>
             <a:r>
               <a:rPr lang="en-US" dirty="0"/>
-              <a:t>In such cases, graph is a good choice for your data structure.</a:t>
-            </a:r>
-          </a:p>
-          <a:p>
-            <a:pPr marL="742950" lvl="1" indent="-285750">
-              <a:buFont typeface="Courier New" panose="02070309020205020404" pitchFamily="49" charset="0"/>
-              <a:buChar char="o"/>
-            </a:pPr>
-            <a:r>
-              <a:rPr lang="en-US" dirty="0"/>
-              <a:t>Graph is flexible and expressive.</a:t>
-            </a:r>
-          </a:p>
-          <a:p>
-            <a:pPr marL="742950" lvl="1" indent="-285750">
-              <a:buFont typeface="Courier New" panose="02070309020205020404" pitchFamily="49" charset="0"/>
-              <a:buChar char="o"/>
-            </a:pPr>
-            <a:r>
-              <a:rPr lang="en-US" dirty="0"/>
-              <a:t>It has node, edge, node label, edge label, node feature, edge feature.</a:t>
+              <a:t>A lot dataset in real world is complicated and cannot be easily written as structure data.</a:t>
             </a:r>
           </a:p>
           <a:p>
@@ -4679,10 +4671,109 @@
               <a:buFont typeface="Arial" panose="020B0604020202020204" pitchFamily="34" charset="0"/>
               <a:buChar char="•"/>
             </a:pPr>
+            <a:endParaRPr lang="en-US" dirty="0"/>
+          </a:p>
+          <a:p>
+            <a:pPr marL="285750" indent="-285750">
+              <a:buFont typeface="Arial" panose="020B0604020202020204" pitchFamily="34" charset="0"/>
+              <a:buChar char="•"/>
+            </a:pPr>
+            <a:r>
+              <a:rPr lang="en-US" dirty="0"/>
+              <a:t>In such cases, graph is a good choice for your data structure.</a:t>
+            </a:r>
+          </a:p>
+          <a:p>
+            <a:pPr marL="742950" lvl="1" indent="-285750">
+              <a:buFont typeface="Courier New" panose="02070309020205020404" pitchFamily="49" charset="0"/>
+              <a:buChar char="o"/>
+            </a:pPr>
+            <a:r>
+              <a:rPr lang="en-US" dirty="0"/>
+              <a:t>Graph is flexible and expressive.</a:t>
+            </a:r>
+          </a:p>
+          <a:p>
+            <a:pPr marL="742950" lvl="1" indent="-285750">
+              <a:buFont typeface="Courier New" panose="02070309020205020404" pitchFamily="49" charset="0"/>
+              <a:buChar char="o"/>
+            </a:pPr>
+            <a:r>
+              <a:rPr lang="en-US" dirty="0"/>
+              <a:t>It has node, edge, node label, edge label, node feature, edge feature.</a:t>
+            </a:r>
+          </a:p>
+          <a:p>
+            <a:pPr marL="285750" indent="-285750">
+              <a:buFont typeface="Arial" panose="020B0604020202020204" pitchFamily="34" charset="0"/>
+              <a:buChar char="•"/>
+            </a:pPr>
+            <a:endParaRPr lang="en-US" dirty="0"/>
+          </a:p>
+          <a:p>
+            <a:pPr marL="285750" indent="-285750">
+              <a:buFont typeface="Arial" panose="020B0604020202020204" pitchFamily="34" charset="0"/>
+              <a:buChar char="•"/>
+            </a:pPr>
             <a:r>
               <a:rPr lang="en-US" dirty="0"/>
               <a:t>DGL provides a scalable implementation of graph and supports all the attributes mentioned above.</a:t>
             </a:r>
+          </a:p>
+        </p:txBody>
+      </p:sp>
+      <p:sp>
+        <p:nvSpPr>
+          <p:cNvPr id="6" name="Rounded Rectangle 5">
+            <a:extLst>
+              <a:ext uri="{FF2B5EF4-FFF2-40B4-BE49-F238E27FC236}">
+                <a16:creationId xmlns:a16="http://schemas.microsoft.com/office/drawing/2014/main" id="{18B5DF6D-776F-1E4B-A5CB-F1082222CC2A}"/>
+              </a:ext>
+            </a:extLst>
+          </p:cNvPr>
+          <p:cNvSpPr/>
+          <p:nvPr/>
+        </p:nvSpPr>
+        <p:spPr>
+          <a:xfrm>
+            <a:off x="6809878" y="1077596"/>
+            <a:ext cx="5347848" cy="5722817"/>
+          </a:xfrm>
+          <a:prstGeom prst="roundRect">
+            <a:avLst/>
+          </a:prstGeom>
+          <a:noFill/>
+          <a:ln>
+            <a:solidFill>
+              <a:schemeClr val="accent2">
+                <a:lumMod val="20000"/>
+                <a:lumOff val="80000"/>
+              </a:schemeClr>
+            </a:solidFill>
+          </a:ln>
+        </p:spPr>
+        <p:style>
+          <a:lnRef idx="2">
+            <a:schemeClr val="accent1">
+              <a:shade val="50000"/>
+            </a:schemeClr>
+          </a:lnRef>
+          <a:fillRef idx="1">
+            <a:schemeClr val="accent1"/>
+          </a:fillRef>
+          <a:effectRef idx="0">
+            <a:schemeClr val="accent1"/>
+          </a:effectRef>
+          <a:fontRef idx="minor">
+            <a:schemeClr val="lt1"/>
+          </a:fontRef>
+        </p:style>
+        <p:txBody>
+          <a:bodyPr rtlCol="0" anchor="ctr"/>
+          <a:lstStyle/>
+          <a:p>
+            <a:pPr algn="ctr"/>
+            <a:endParaRPr lang="en-US"/>
           </a:p>
         </p:txBody>
       </p:sp>
@@ -4716,6 +4807,36 @@
           <a:chExt cx="0" cy="0"/>
         </a:xfrm>
       </p:grpSpPr>
+      <p:pic>
+        <p:nvPicPr>
+          <p:cNvPr id="9" name="Picture 8">
+            <a:extLst>
+              <a:ext uri="{FF2B5EF4-FFF2-40B4-BE49-F238E27FC236}">
+                <a16:creationId xmlns:a16="http://schemas.microsoft.com/office/drawing/2014/main" id="{16A7855A-EE79-2F43-A864-21C75B47A02F}"/>
+              </a:ext>
+            </a:extLst>
+          </p:cNvPr>
+          <p:cNvPicPr>
+            <a:picLocks noChangeAspect="1"/>
+          </p:cNvPicPr>
+          <p:nvPr/>
+        </p:nvPicPr>
+        <p:blipFill>
+          <a:blip r:embed="rId2"/>
+          <a:stretch>
+            <a:fillRect/>
+          </a:stretch>
+        </p:blipFill>
+        <p:spPr>
+          <a:xfrm>
+            <a:off x="7515727" y="3844498"/>
+            <a:ext cx="2844800" cy="863600"/>
+          </a:xfrm>
+          <a:prstGeom prst="rect">
+            <a:avLst/>
+          </a:prstGeom>
+        </p:spPr>
+      </p:pic>
       <p:sp>
         <p:nvSpPr>
           <p:cNvPr id="2" name="TextBox 1">
@@ -4749,17 +4870,261 @@
           <a:p>
             <a:r>
               <a:rPr lang="en-US" sz="3200" dirty="0"/>
-              <a:t>When you want to do fast prototyping with popular GNN algorithm</a:t>
+              <a:t>When you want to do fast prototyping with popular GNN algorithms</a:t>
+            </a:r>
+          </a:p>
+        </p:txBody>
+      </p:sp>
+      <p:sp>
+        <p:nvSpPr>
+          <p:cNvPr id="4" name="TextBox 3">
+            <a:extLst>
+              <a:ext uri="{FF2B5EF4-FFF2-40B4-BE49-F238E27FC236}">
+                <a16:creationId xmlns:a16="http://schemas.microsoft.com/office/drawing/2014/main" id="{3285A204-CB64-564D-AAE0-38F4687A0BBC}"/>
+              </a:ext>
+            </a:extLst>
+          </p:cNvPr>
+          <p:cNvSpPr txBox="1"/>
+          <p:nvPr/>
+        </p:nvSpPr>
+        <p:spPr>
+          <a:xfrm>
+            <a:off x="838113" y="1720840"/>
+            <a:ext cx="5777338" cy="4247317"/>
+          </a:xfrm>
+          <a:prstGeom prst="rect">
+            <a:avLst/>
+          </a:prstGeom>
+          <a:noFill/>
+        </p:spPr>
+        <p:txBody>
+          <a:bodyPr wrap="square" rtlCol="0">
+            <a:spAutoFit/>
+          </a:bodyPr>
+          <a:lstStyle/>
+          <a:p>
+            <a:endParaRPr lang="en-US" dirty="0"/>
+          </a:p>
+          <a:p>
+            <a:pPr marL="285750" indent="-285750">
+              <a:buFont typeface="Arial" panose="020B0604020202020204" pitchFamily="34" charset="0"/>
+              <a:buChar char="•"/>
+            </a:pPr>
+            <a:r>
+              <a:rPr lang="en-US" dirty="0"/>
+              <a:t>As GNN draws more attentions recent years, a lot algorithms are proposed and some of them are proven to be effective in real world problem solving.</a:t>
+            </a:r>
+          </a:p>
+          <a:p>
+            <a:endParaRPr lang="en-US" dirty="0"/>
+          </a:p>
+          <a:p>
+            <a:pPr marL="285750" indent="-285750">
+              <a:buFont typeface="Arial" panose="020B0604020202020204" pitchFamily="34" charset="0"/>
+              <a:buChar char="•"/>
+            </a:pPr>
+            <a:r>
+              <a:rPr lang="en-US" dirty="0"/>
+              <a:t>A lot of popular graph neural network modules are implement in and ready to use with DGL.</a:t>
+            </a:r>
+          </a:p>
+          <a:p>
+            <a:pPr marL="285750" indent="-285750">
+              <a:buFont typeface="Arial" panose="020B0604020202020204" pitchFamily="34" charset="0"/>
+              <a:buChar char="•"/>
+            </a:pPr>
+            <a:endParaRPr lang="en-US" dirty="0"/>
+          </a:p>
+          <a:p>
+            <a:pPr lvl="1"/>
+            <a:r>
+              <a:rPr lang="en-US" i="1" dirty="0" err="1"/>
+              <a:t>GraphConv</a:t>
+            </a:r>
+            <a:r>
+              <a:rPr lang="en-US" i="1" dirty="0"/>
+              <a:t>, </a:t>
+            </a:r>
+            <a:r>
+              <a:rPr lang="en-US" i="1" dirty="0" err="1"/>
+              <a:t>RelGraphConv</a:t>
+            </a:r>
+            <a:r>
+              <a:rPr lang="en-US" i="1" dirty="0"/>
+              <a:t>, </a:t>
+            </a:r>
+            <a:r>
+              <a:rPr lang="en-US" i="1" dirty="0" err="1"/>
+              <a:t>TAGConv</a:t>
+            </a:r>
+            <a:r>
+              <a:rPr lang="en-US" i="1" dirty="0"/>
+              <a:t>, </a:t>
+            </a:r>
+            <a:r>
+              <a:rPr lang="en-US" i="1" dirty="0" err="1"/>
+              <a:t>GATConv</a:t>
+            </a:r>
+            <a:r>
+              <a:rPr lang="en-US" i="1" dirty="0"/>
+              <a:t>, </a:t>
+            </a:r>
+            <a:r>
+              <a:rPr lang="en-US" i="1" dirty="0" err="1"/>
+              <a:t>EdgeConv</a:t>
+            </a:r>
+            <a:r>
+              <a:rPr lang="en-US" i="1" dirty="0"/>
+              <a:t>, </a:t>
+            </a:r>
+            <a:r>
+              <a:rPr lang="en-US" i="1" dirty="0" err="1"/>
+              <a:t>SAGEConv</a:t>
+            </a:r>
+            <a:r>
+              <a:rPr lang="en-US" i="1" dirty="0"/>
+              <a:t>, </a:t>
+            </a:r>
+            <a:r>
+              <a:rPr lang="en-US" i="1" dirty="0" err="1"/>
+              <a:t>APPNPConv</a:t>
+            </a:r>
+            <a:r>
+              <a:rPr lang="en-US" i="1" dirty="0"/>
+              <a:t>, </a:t>
+            </a:r>
+            <a:r>
+              <a:rPr lang="en-US" i="1" dirty="0" err="1"/>
+              <a:t>GINConv</a:t>
+            </a:r>
+            <a:r>
+              <a:rPr lang="en-US" i="1" dirty="0"/>
+              <a:t>, </a:t>
+            </a:r>
+            <a:r>
+              <a:rPr lang="en-US" i="1" dirty="0" err="1"/>
+              <a:t>GatedGraphConv</a:t>
+            </a:r>
+            <a:r>
+              <a:rPr lang="en-US" i="1" dirty="0"/>
+              <a:t>, </a:t>
+            </a:r>
+            <a:r>
+              <a:rPr lang="en-US" i="1" dirty="0" err="1"/>
+              <a:t>GMMConv</a:t>
+            </a:r>
+            <a:r>
+              <a:rPr lang="en-US" i="1" dirty="0"/>
+              <a:t>, </a:t>
+            </a:r>
+            <a:r>
+              <a:rPr lang="en-US" i="1" dirty="0" err="1"/>
+              <a:t>ChebConv</a:t>
+            </a:r>
+            <a:r>
+              <a:rPr lang="en-US" i="1" dirty="0"/>
+              <a:t>, </a:t>
+            </a:r>
+            <a:r>
+              <a:rPr lang="en-US" i="1" dirty="0" err="1"/>
+              <a:t>AGNNConv</a:t>
+            </a:r>
+            <a:r>
+              <a:rPr lang="en-US" i="1" dirty="0"/>
+              <a:t>, </a:t>
+            </a:r>
+            <a:r>
+              <a:rPr lang="en-US" i="1" dirty="0" err="1"/>
+              <a:t>NNConv</a:t>
+            </a:r>
+            <a:r>
+              <a:rPr lang="en-US" i="1" dirty="0"/>
+              <a:t>, </a:t>
+            </a:r>
+            <a:r>
+              <a:rPr lang="en-US" i="1" dirty="0" err="1"/>
+              <a:t>AtomicConv</a:t>
+            </a:r>
+            <a:r>
+              <a:rPr lang="en-US" i="1" dirty="0"/>
+              <a:t> and so many more… </a:t>
+            </a:r>
+          </a:p>
+          <a:p>
+            <a:pPr lvl="1"/>
+            <a:endParaRPr lang="en-US" i="1" dirty="0"/>
+          </a:p>
+          <a:p>
+            <a:pPr marL="285750" indent="-285750">
+              <a:buFont typeface="Arial" panose="020B0604020202020204" pitchFamily="34" charset="0"/>
+              <a:buChar char="•"/>
+            </a:pPr>
+            <a:r>
+              <a:rPr lang="en-US" dirty="0"/>
+              <a:t>You can use them just other modules in </a:t>
+            </a:r>
+            <a:r>
+              <a:rPr lang="en-US" dirty="0" err="1"/>
+              <a:t>PyTorch</a:t>
+            </a:r>
+            <a:r>
+              <a:rPr lang="en-US" dirty="0"/>
+              <a:t>, </a:t>
+            </a:r>
+            <a:r>
+              <a:rPr lang="en-US" dirty="0" err="1"/>
+              <a:t>Tensorflow</a:t>
+            </a:r>
+            <a:r>
+              <a:rPr lang="en-US" dirty="0"/>
+              <a:t>, </a:t>
+            </a:r>
+            <a:r>
+              <a:rPr lang="en-US" dirty="0" err="1"/>
+              <a:t>MXNet</a:t>
+            </a:r>
+            <a:r>
+              <a:rPr lang="en-US" dirty="0"/>
+              <a:t>.</a:t>
             </a:r>
           </a:p>
         </p:txBody>
       </p:sp>
       <p:pic>
         <p:nvPicPr>
-          <p:cNvPr id="3" name="Picture 2">
-            <a:extLst>
-              <a:ext uri="{FF2B5EF4-FFF2-40B4-BE49-F238E27FC236}">
-                <a16:creationId xmlns:a16="http://schemas.microsoft.com/office/drawing/2014/main" id="{0C03DB24-C7AA-EB48-8CCD-A4864B2BD15E}"/>
+          <p:cNvPr id="7" name="Picture 6">
+            <a:extLst>
+              <a:ext uri="{FF2B5EF4-FFF2-40B4-BE49-F238E27FC236}">
+                <a16:creationId xmlns:a16="http://schemas.microsoft.com/office/drawing/2014/main" id="{83BBCCCD-EDF2-AC43-9BB3-C0A0A94B3581}"/>
+              </a:ext>
+            </a:extLst>
+          </p:cNvPr>
+          <p:cNvPicPr>
+            <a:picLocks noChangeAspect="1"/>
+          </p:cNvPicPr>
+          <p:nvPr/>
+        </p:nvPicPr>
+        <p:blipFill rotWithShape="1">
+          <a:blip r:embed="rId3"/>
+          <a:srcRect t="13661" r="18102" b="37013"/>
+          <a:stretch/>
+        </p:blipFill>
+        <p:spPr>
+          <a:xfrm>
+            <a:off x="7515727" y="5684220"/>
+            <a:ext cx="4118810" cy="757989"/>
+          </a:xfrm>
+          <a:prstGeom prst="rect">
+            <a:avLst/>
+          </a:prstGeom>
+        </p:spPr>
+      </p:pic>
+      <p:pic>
+        <p:nvPicPr>
+          <p:cNvPr id="2050" name="Picture 2">
+            <a:extLst>
+              <a:ext uri="{FF2B5EF4-FFF2-40B4-BE49-F238E27FC236}">
+                <a16:creationId xmlns:a16="http://schemas.microsoft.com/office/drawing/2014/main" id="{34B71095-D717-384E-8B4C-BA142FE839C7}"/>
               </a:ext>
             </a:extLst>
           </p:cNvPr>
@@ -4768,21 +5133,23 @@
           </p:cNvPicPr>
           <p:nvPr/>
         </p:nvPicPr>
-        <p:blipFill rotWithShape="1">
-          <a:blip r:embed="rId2" cstate="print">
+        <p:blipFill>
+          <a:blip r:embed="rId4">
             <a:extLst>
               <a:ext uri="{28A0092B-C50C-407E-A947-70E740481C1C}">
                 <a14:useLocalDpi xmlns:a14="http://schemas.microsoft.com/office/drawing/2010/main" val="0"/>
               </a:ext>
             </a:extLst>
           </a:blip>
-          <a:srcRect t="4116" b="4317"/>
-          <a:stretch/>
+          <a:srcRect/>
+          <a:stretch>
+            <a:fillRect/>
+          </a:stretch>
         </p:blipFill>
         <p:spPr bwMode="auto">
           <a:xfrm>
-            <a:off x="7156704" y="1896413"/>
-            <a:ext cx="4197182" cy="2376264"/>
+            <a:off x="7714306" y="1299822"/>
+            <a:ext cx="4005865" cy="2616866"/>
           </a:xfrm>
           <a:prstGeom prst="rect">
             <a:avLst/>
@@ -4799,227 +5166,12 @@
           </a:extLst>
         </p:spPr>
       </p:pic>
-      <p:sp>
-        <p:nvSpPr>
-          <p:cNvPr id="4" name="TextBox 3">
-            <a:extLst>
-              <a:ext uri="{FF2B5EF4-FFF2-40B4-BE49-F238E27FC236}">
-                <a16:creationId xmlns:a16="http://schemas.microsoft.com/office/drawing/2014/main" id="{3285A204-CB64-564D-AAE0-38F4687A0BBC}"/>
-              </a:ext>
-            </a:extLst>
-          </p:cNvPr>
-          <p:cNvSpPr txBox="1"/>
-          <p:nvPr/>
-        </p:nvSpPr>
-        <p:spPr>
-          <a:xfrm>
-            <a:off x="838113" y="1720840"/>
-            <a:ext cx="5777338" cy="4247317"/>
-          </a:xfrm>
-          <a:prstGeom prst="rect">
-            <a:avLst/>
-          </a:prstGeom>
-          <a:noFill/>
-        </p:spPr>
-        <p:txBody>
-          <a:bodyPr wrap="square" rtlCol="0">
-            <a:spAutoFit/>
-          </a:bodyPr>
-          <a:lstStyle/>
-          <a:p>
-            <a:endParaRPr lang="en-US" dirty="0"/>
-          </a:p>
-          <a:p>
-            <a:pPr marL="285750" indent="-285750">
-              <a:buFont typeface="Arial" panose="020B0604020202020204" pitchFamily="34" charset="0"/>
-              <a:buChar char="•"/>
-            </a:pPr>
-            <a:r>
-              <a:rPr lang="en-US" dirty="0"/>
-              <a:t>As GNN draws more attentions recent years, a lot algorithms are proposed and some of them are proven to be effective in real world problem solving.</a:t>
-            </a:r>
-          </a:p>
-          <a:p>
-            <a:endParaRPr lang="en-US" dirty="0"/>
-          </a:p>
-          <a:p>
-            <a:pPr marL="285750" indent="-285750">
-              <a:buFont typeface="Arial" panose="020B0604020202020204" pitchFamily="34" charset="0"/>
-              <a:buChar char="•"/>
-            </a:pPr>
-            <a:r>
-              <a:rPr lang="en-US" dirty="0"/>
-              <a:t>A lot of popular graph neural network modules are implement in and ready to use with DGL.</a:t>
-            </a:r>
-          </a:p>
-          <a:p>
-            <a:pPr marL="285750" indent="-285750">
-              <a:buFont typeface="Arial" panose="020B0604020202020204" pitchFamily="34" charset="0"/>
-              <a:buChar char="•"/>
-            </a:pPr>
-            <a:endParaRPr lang="en-US" dirty="0"/>
-          </a:p>
-          <a:p>
-            <a:pPr lvl="1"/>
-            <a:r>
-              <a:rPr lang="en-US" i="1" dirty="0" err="1"/>
-              <a:t>GraphConv</a:t>
-            </a:r>
-            <a:r>
-              <a:rPr lang="en-US" i="1" dirty="0"/>
-              <a:t>, </a:t>
-            </a:r>
-            <a:r>
-              <a:rPr lang="en-US" i="1" dirty="0" err="1"/>
-              <a:t>RelGraphConv</a:t>
-            </a:r>
-            <a:r>
-              <a:rPr lang="en-US" i="1" dirty="0"/>
-              <a:t>, </a:t>
-            </a:r>
-            <a:r>
-              <a:rPr lang="en-US" i="1" dirty="0" err="1"/>
-              <a:t>TAGConv</a:t>
-            </a:r>
-            <a:r>
-              <a:rPr lang="en-US" i="1" dirty="0"/>
-              <a:t>, </a:t>
-            </a:r>
-            <a:r>
-              <a:rPr lang="en-US" i="1" dirty="0" err="1"/>
-              <a:t>GATConv</a:t>
-            </a:r>
-            <a:r>
-              <a:rPr lang="en-US" i="1" dirty="0"/>
-              <a:t>, </a:t>
-            </a:r>
-            <a:r>
-              <a:rPr lang="en-US" i="1" dirty="0" err="1"/>
-              <a:t>EdgeConv</a:t>
-            </a:r>
-            <a:r>
-              <a:rPr lang="en-US" i="1" dirty="0"/>
-              <a:t>, </a:t>
-            </a:r>
-            <a:r>
-              <a:rPr lang="en-US" i="1" dirty="0" err="1"/>
-              <a:t>SAGEConv</a:t>
-            </a:r>
-            <a:r>
-              <a:rPr lang="en-US" i="1" dirty="0"/>
-              <a:t>, </a:t>
-            </a:r>
-            <a:r>
-              <a:rPr lang="en-US" i="1" dirty="0" err="1"/>
-              <a:t>APPNPConv</a:t>
-            </a:r>
-            <a:r>
-              <a:rPr lang="en-US" i="1" dirty="0"/>
-              <a:t>, </a:t>
-            </a:r>
-            <a:r>
-              <a:rPr lang="en-US" i="1" dirty="0" err="1"/>
-              <a:t>GINConv</a:t>
-            </a:r>
-            <a:r>
-              <a:rPr lang="en-US" i="1" dirty="0"/>
-              <a:t>, </a:t>
-            </a:r>
-            <a:r>
-              <a:rPr lang="en-US" i="1" dirty="0" err="1"/>
-              <a:t>GatedGraphConv</a:t>
-            </a:r>
-            <a:r>
-              <a:rPr lang="en-US" i="1" dirty="0"/>
-              <a:t>, </a:t>
-            </a:r>
-            <a:r>
-              <a:rPr lang="en-US" i="1" dirty="0" err="1"/>
-              <a:t>GMMConv</a:t>
-            </a:r>
-            <a:r>
-              <a:rPr lang="en-US" i="1" dirty="0"/>
-              <a:t>, </a:t>
-            </a:r>
-            <a:r>
-              <a:rPr lang="en-US" i="1" dirty="0" err="1"/>
-              <a:t>ChebConv</a:t>
-            </a:r>
-            <a:r>
-              <a:rPr lang="en-US" i="1" dirty="0"/>
-              <a:t>, </a:t>
-            </a:r>
-            <a:r>
-              <a:rPr lang="en-US" i="1" dirty="0" err="1"/>
-              <a:t>AGNNConv</a:t>
-            </a:r>
-            <a:r>
-              <a:rPr lang="en-US" i="1" dirty="0"/>
-              <a:t>, </a:t>
-            </a:r>
-            <a:r>
-              <a:rPr lang="en-US" i="1" dirty="0" err="1"/>
-              <a:t>NNConv</a:t>
-            </a:r>
-            <a:r>
-              <a:rPr lang="en-US" i="1" dirty="0"/>
-              <a:t>, </a:t>
-            </a:r>
-            <a:r>
-              <a:rPr lang="en-US" i="1" dirty="0" err="1"/>
-              <a:t>AtomicConv</a:t>
-            </a:r>
-            <a:r>
-              <a:rPr lang="en-US" i="1" dirty="0"/>
-              <a:t> and so many more… </a:t>
-            </a:r>
-          </a:p>
-          <a:p>
-            <a:pPr lvl="1"/>
-            <a:endParaRPr lang="en-US" i="1" dirty="0"/>
-          </a:p>
-          <a:p>
-            <a:pPr marL="285750" indent="-285750">
-              <a:buFont typeface="Arial" panose="020B0604020202020204" pitchFamily="34" charset="0"/>
-              <a:buChar char="•"/>
-            </a:pPr>
-            <a:r>
-              <a:rPr lang="en-US" dirty="0"/>
-              <a:t>You can use them just other modules in </a:t>
-            </a:r>
-            <a:r>
-              <a:rPr lang="en-US" dirty="0" err="1"/>
-              <a:t>PyTorch</a:t>
-            </a:r>
-            <a:r>
-              <a:rPr lang="en-US" dirty="0"/>
-              <a:t>, </a:t>
-            </a:r>
-            <a:r>
-              <a:rPr lang="en-US" dirty="0" err="1"/>
-              <a:t>Tensorflow</a:t>
-            </a:r>
-            <a:r>
-              <a:rPr lang="en-US" dirty="0"/>
-              <a:t>, </a:t>
-            </a:r>
-            <a:r>
-              <a:rPr lang="en-US" dirty="0" err="1"/>
-              <a:t>MXNet</a:t>
-            </a:r>
-            <a:r>
-              <a:rPr lang="en-US" dirty="0"/>
-              <a:t>.</a:t>
-            </a:r>
-          </a:p>
-        </p:txBody>
-      </p:sp>
       <p:pic>
         <p:nvPicPr>
-          <p:cNvPr id="6" name="Picture 5">
-            <a:extLst>
-              <a:ext uri="{FF2B5EF4-FFF2-40B4-BE49-F238E27FC236}">
-                <a16:creationId xmlns:a16="http://schemas.microsoft.com/office/drawing/2014/main" id="{D72E41F9-E078-4141-8EF7-E092CA3A35C9}"/>
+          <p:cNvPr id="11" name="Picture 10">
+            <a:extLst>
+              <a:ext uri="{FF2B5EF4-FFF2-40B4-BE49-F238E27FC236}">
+                <a16:creationId xmlns:a16="http://schemas.microsoft.com/office/drawing/2014/main" id="{5D16EAA3-D2C4-B14C-835D-8F10722E6628}"/>
               </a:ext>
             </a:extLst>
           </p:cNvPr>
@@ -5029,15 +5181,15 @@
           <p:nvPr/>
         </p:nvPicPr>
         <p:blipFill>
-          <a:blip r:embed="rId3"/>
+          <a:blip r:embed="rId5"/>
           <a:stretch>
             <a:fillRect/>
           </a:stretch>
         </p:blipFill>
         <p:spPr>
           <a:xfrm>
-            <a:off x="7156704" y="4609766"/>
-            <a:ext cx="4457700" cy="1536700"/>
+            <a:off x="7630085" y="4608362"/>
+            <a:ext cx="3467100" cy="927100"/>
           </a:xfrm>
           <a:prstGeom prst="rect">
             <a:avLst/>
@@ -5120,7 +5272,17 @@
             </a:pPr>
             <a:r>
               <a:rPr lang="en-US" dirty="0"/>
-              <a:t>Have your own idea on graph analysis? Or want to try a graph algorithm just published? Message passing API is born for it.</a:t>
+              <a:t>Have your own idea on graph analysis? Or want to try a graph algorithm just published? </a:t>
+            </a:r>
+          </a:p>
+          <a:p>
+            <a:pPr marL="285750" indent="-285750">
+              <a:buFont typeface="Arial" panose="020B0604020202020204" pitchFamily="34" charset="0"/>
+              <a:buChar char="•"/>
+            </a:pPr>
+            <a:r>
+              <a:rPr lang="en-US" dirty="0"/>
+              <a:t>DGL Message passing API is an intuitive way to do it.</a:t>
             </a:r>
           </a:p>
           <a:p>
@@ -5137,7 +5299,15 @@
             </a:pPr>
             <a:r>
               <a:rPr lang="en-US" dirty="0"/>
-              <a:t>For example, the well known PageRank algorithm can be implemented with Message Passing in a few lines of code.</a:t>
+              <a:t>For example, the well known </a:t>
+            </a:r>
+            <a:r>
+              <a:rPr lang="en-US" dirty="0" err="1"/>
+              <a:t>GraphSAGE</a:t>
+            </a:r>
+            <a:r>
+              <a:rPr lang="en-US" dirty="0"/>
+              <a:t> model can be implemented with Message Passing in a few lines of code.</a:t>
             </a:r>
           </a:p>
           <a:p>
@@ -5151,10 +5321,10 @@
       </p:sp>
       <p:pic>
         <p:nvPicPr>
-          <p:cNvPr id="5" name="Picture 4">
-            <a:extLst>
-              <a:ext uri="{FF2B5EF4-FFF2-40B4-BE49-F238E27FC236}">
-                <a16:creationId xmlns:a16="http://schemas.microsoft.com/office/drawing/2014/main" id="{63050C74-51F6-F048-9412-1723D964B4D1}"/>
+          <p:cNvPr id="4" name="Picture 3">
+            <a:extLst>
+              <a:ext uri="{FF2B5EF4-FFF2-40B4-BE49-F238E27FC236}">
+                <a16:creationId xmlns:a16="http://schemas.microsoft.com/office/drawing/2014/main" id="{9DEB78A9-C59C-D949-B457-FA8792958909}"/>
               </a:ext>
             </a:extLst>
           </p:cNvPr>
@@ -5171,8 +5341,8 @@
         </p:blipFill>
         <p:spPr>
           <a:xfrm>
-            <a:off x="1257119" y="3251873"/>
-            <a:ext cx="9118600" cy="1892300"/>
+            <a:off x="1142999" y="3438388"/>
+            <a:ext cx="8387682" cy="2906045"/>
           </a:xfrm>
           <a:prstGeom prst="rect">
             <a:avLst/>
@@ -5223,7 +5393,7 @@
         </p:nvSpPr>
         <p:spPr>
           <a:xfrm>
-            <a:off x="977030" y="513567"/>
+            <a:off x="977030" y="333087"/>
             <a:ext cx="9678778" cy="3077766"/>
           </a:xfrm>
           <a:prstGeom prst="rect">
@@ -5292,7 +5462,7 @@
             </a:pPr>
             <a:r>
               <a:rPr lang="en-US" dirty="0"/>
-              <a:t>Sampling and batching API.</a:t>
+              <a:t>Sampling and batching API: focus only on part of a graph for each train step.</a:t>
             </a:r>
           </a:p>
           <a:p>
@@ -5302,7 +5472,7 @@
             </a:pPr>
             <a:r>
               <a:rPr lang="en-US" dirty="0"/>
-              <a:t>Multi GPU training. </a:t>
+              <a:t>Multi GPU training: parallelly train the model with multiple GPUs.</a:t>
             </a:r>
           </a:p>
           <a:p>
@@ -5343,7 +5513,7 @@
         </p:blipFill>
         <p:spPr bwMode="auto">
           <a:xfrm>
-            <a:off x="2889263" y="3765885"/>
+            <a:off x="6895499" y="3886203"/>
             <a:ext cx="4897494" cy="2301822"/>
           </a:xfrm>
           <a:prstGeom prst="rect">
@@ -5361,6 +5531,111 @@
           </a:extLst>
         </p:spPr>
       </p:pic>
+      <p:pic>
+        <p:nvPicPr>
+          <p:cNvPr id="4" name="Picture 3">
+            <a:extLst>
+              <a:ext uri="{FF2B5EF4-FFF2-40B4-BE49-F238E27FC236}">
+                <a16:creationId xmlns:a16="http://schemas.microsoft.com/office/drawing/2014/main" id="{71BC48D6-A7DA-F248-A364-B68E76A9B49F}"/>
+              </a:ext>
+            </a:extLst>
+          </p:cNvPr>
+          <p:cNvPicPr>
+            <a:picLocks noChangeAspect="1"/>
+          </p:cNvPicPr>
+          <p:nvPr/>
+        </p:nvPicPr>
+        <p:blipFill rotWithShape="1">
+          <a:blip r:embed="rId3"/>
+          <a:srcRect l="17240" r="32500" b="53409"/>
+          <a:stretch/>
+        </p:blipFill>
+        <p:spPr>
+          <a:xfrm>
+            <a:off x="4053444" y="4011298"/>
+            <a:ext cx="2042556" cy="1420092"/>
+          </a:xfrm>
+          <a:prstGeom prst="rect">
+            <a:avLst/>
+          </a:prstGeom>
+        </p:spPr>
+      </p:pic>
+      <p:pic>
+        <p:nvPicPr>
+          <p:cNvPr id="5" name="Picture 4">
+            <a:extLst>
+              <a:ext uri="{FF2B5EF4-FFF2-40B4-BE49-F238E27FC236}">
+                <a16:creationId xmlns:a16="http://schemas.microsoft.com/office/drawing/2014/main" id="{C6F76E0B-46AE-CD4E-AC34-00AB7AC0E02E}"/>
+              </a:ext>
+            </a:extLst>
+          </p:cNvPr>
+          <p:cNvPicPr>
+            <a:picLocks noChangeAspect="1"/>
+          </p:cNvPicPr>
+          <p:nvPr/>
+        </p:nvPicPr>
+        <p:blipFill>
+          <a:blip r:embed="rId4"/>
+          <a:stretch>
+            <a:fillRect/>
+          </a:stretch>
+        </p:blipFill>
+        <p:spPr>
+          <a:xfrm>
+            <a:off x="191320" y="3410853"/>
+            <a:ext cx="3918857" cy="2939143"/>
+          </a:xfrm>
+          <a:prstGeom prst="rect">
+            <a:avLst/>
+          </a:prstGeom>
+        </p:spPr>
+      </p:pic>
+      <p:sp>
+        <p:nvSpPr>
+          <p:cNvPr id="8" name="Right Arrow 7">
+            <a:extLst>
+              <a:ext uri="{FF2B5EF4-FFF2-40B4-BE49-F238E27FC236}">
+                <a16:creationId xmlns:a16="http://schemas.microsoft.com/office/drawing/2014/main" id="{C8B783EC-4E24-A04C-85B0-F1DC1D3FA9CC}"/>
+              </a:ext>
+            </a:extLst>
+          </p:cNvPr>
+          <p:cNvSpPr/>
+          <p:nvPr/>
+        </p:nvSpPr>
+        <p:spPr>
+          <a:xfrm>
+            <a:off x="3253945" y="4403184"/>
+            <a:ext cx="795647" cy="318160"/>
+          </a:xfrm>
+          <a:prstGeom prst="rightArrow">
+            <a:avLst/>
+          </a:prstGeom>
+        </p:spPr>
+        <p:style>
+          <a:lnRef idx="2">
+            <a:schemeClr val="accent1">
+              <a:shade val="50000"/>
+            </a:schemeClr>
+          </a:lnRef>
+          <a:fillRef idx="1">
+            <a:schemeClr val="accent1"/>
+          </a:fillRef>
+          <a:effectRef idx="0">
+            <a:schemeClr val="accent1"/>
+          </a:effectRef>
+          <a:fontRef idx="minor">
+            <a:schemeClr val="lt1"/>
+          </a:fontRef>
+        </p:style>
+        <p:txBody>
+          <a:bodyPr rtlCol="0" anchor="ctr"/>
+          <a:lstStyle/>
+          <a:p>
+            <a:pPr algn="ctr"/>
+            <a:endParaRPr lang="en-US"/>
+          </a:p>
+        </p:txBody>
+      </p:sp>
     </p:spTree>
     <p:extLst>
       <p:ext uri="{BB962C8B-B14F-4D97-AF65-F5344CB8AC3E}">

</xml_diff>

<commit_message>
update information for dgl domain apps
</commit_message>
<xml_diff>
--- a/Session02.pptx
+++ b/Session02.pptx
@@ -4,6 +4,9 @@
   <p:sldMasterIdLst>
     <p:sldMasterId id="2147483648" r:id="rId1"/>
   </p:sldMasterIdLst>
+  <p:notesMasterIdLst>
+    <p:notesMasterId r:id="rId13"/>
+  </p:notesMasterIdLst>
   <p:sldIdLst>
     <p:sldId id="256" r:id="rId2"/>
     <p:sldId id="257" r:id="rId3"/>
@@ -15,6 +18,7 @@
     <p:sldId id="268" r:id="rId9"/>
     <p:sldId id="269" r:id="rId10"/>
     <p:sldId id="265" r:id="rId11"/>
+    <p:sldId id="1638" r:id="rId12"/>
   </p:sldIdLst>
   <p:sldSz cx="12192000" cy="6858000"/>
   <p:notesSz cx="6858000" cy="9144000"/>
@@ -121,6 +125,439 @@
 </p:presentation>
 </file>
 
+<file path=ppt/notesMasters/notesMaster1.xml><?xml version="1.0" encoding="utf-8"?>
+<p:notesMaster xmlns:a="http://schemas.openxmlformats.org/drawingml/2006/main" xmlns:r="http://schemas.openxmlformats.org/officeDocument/2006/relationships" xmlns:p="http://schemas.openxmlformats.org/presentationml/2006/main">
+  <p:cSld>
+    <p:bg>
+      <p:bgRef idx="1001">
+        <a:schemeClr val="bg1"/>
+      </p:bgRef>
+    </p:bg>
+    <p:spTree>
+      <p:nvGrpSpPr>
+        <p:cNvPr id="1" name=""/>
+        <p:cNvGrpSpPr/>
+        <p:nvPr/>
+      </p:nvGrpSpPr>
+      <p:grpSpPr>
+        <a:xfrm>
+          <a:off x="0" y="0"/>
+          <a:ext cx="0" cy="0"/>
+          <a:chOff x="0" y="0"/>
+          <a:chExt cx="0" cy="0"/>
+        </a:xfrm>
+      </p:grpSpPr>
+      <p:sp>
+        <p:nvSpPr>
+          <p:cNvPr id="2" name="Header Placeholder 1"/>
+          <p:cNvSpPr>
+            <a:spLocks noGrp="1"/>
+          </p:cNvSpPr>
+          <p:nvPr>
+            <p:ph type="hdr" sz="quarter"/>
+          </p:nvPr>
+        </p:nvSpPr>
+        <p:spPr>
+          <a:xfrm>
+            <a:off x="0" y="0"/>
+            <a:ext cx="2971800" cy="458788"/>
+          </a:xfrm>
+          <a:prstGeom prst="rect">
+            <a:avLst/>
+          </a:prstGeom>
+        </p:spPr>
+        <p:txBody>
+          <a:bodyPr vert="horz" lIns="91440" tIns="45720" rIns="91440" bIns="45720" rtlCol="0"/>
+          <a:lstStyle>
+            <a:lvl1pPr algn="l">
+              <a:defRPr sz="1200"/>
+            </a:lvl1pPr>
+          </a:lstStyle>
+          <a:p>
+            <a:endParaRPr lang="en-US"/>
+          </a:p>
+        </p:txBody>
+      </p:sp>
+      <p:sp>
+        <p:nvSpPr>
+          <p:cNvPr id="3" name="Date Placeholder 2"/>
+          <p:cNvSpPr>
+            <a:spLocks noGrp="1"/>
+          </p:cNvSpPr>
+          <p:nvPr>
+            <p:ph type="dt" idx="1"/>
+          </p:nvPr>
+        </p:nvSpPr>
+        <p:spPr>
+          <a:xfrm>
+            <a:off x="3884613" y="0"/>
+            <a:ext cx="2971800" cy="458788"/>
+          </a:xfrm>
+          <a:prstGeom prst="rect">
+            <a:avLst/>
+          </a:prstGeom>
+        </p:spPr>
+        <p:txBody>
+          <a:bodyPr vert="horz" lIns="91440" tIns="45720" rIns="91440" bIns="45720" rtlCol="0"/>
+          <a:lstStyle>
+            <a:lvl1pPr algn="r">
+              <a:defRPr sz="1200"/>
+            </a:lvl1pPr>
+          </a:lstStyle>
+          <a:p>
+            <a:fld id="{D57B58D0-3E98-4B4A-8887-8BD06449F8B4}" type="datetimeFigureOut">
+              <a:rPr lang="en-US" smtClean="0"/>
+              <a:t>4/6/20</a:t>
+            </a:fld>
+            <a:endParaRPr lang="en-US"/>
+          </a:p>
+        </p:txBody>
+      </p:sp>
+      <p:sp>
+        <p:nvSpPr>
+          <p:cNvPr id="4" name="Slide Image Placeholder 3"/>
+          <p:cNvSpPr>
+            <a:spLocks noGrp="1" noRot="1" noChangeAspect="1"/>
+          </p:cNvSpPr>
+          <p:nvPr>
+            <p:ph type="sldImg" idx="2"/>
+          </p:nvPr>
+        </p:nvSpPr>
+        <p:spPr>
+          <a:xfrm>
+            <a:off x="685800" y="1143000"/>
+            <a:ext cx="5486400" cy="3086100"/>
+          </a:xfrm>
+          <a:prstGeom prst="rect">
+            <a:avLst/>
+          </a:prstGeom>
+          <a:noFill/>
+          <a:ln w="12700">
+            <a:solidFill>
+              <a:prstClr val="black"/>
+            </a:solidFill>
+          </a:ln>
+        </p:spPr>
+        <p:txBody>
+          <a:bodyPr vert="horz" lIns="91440" tIns="45720" rIns="91440" bIns="45720" rtlCol="0" anchor="ctr"/>
+          <a:lstStyle/>
+          <a:p>
+            <a:endParaRPr lang="en-US"/>
+          </a:p>
+        </p:txBody>
+      </p:sp>
+      <p:sp>
+        <p:nvSpPr>
+          <p:cNvPr id="5" name="Notes Placeholder 4"/>
+          <p:cNvSpPr>
+            <a:spLocks noGrp="1"/>
+          </p:cNvSpPr>
+          <p:nvPr>
+            <p:ph type="body" sz="quarter" idx="3"/>
+          </p:nvPr>
+        </p:nvSpPr>
+        <p:spPr>
+          <a:xfrm>
+            <a:off x="685800" y="4400550"/>
+            <a:ext cx="5486400" cy="3600450"/>
+          </a:xfrm>
+          <a:prstGeom prst="rect">
+            <a:avLst/>
+          </a:prstGeom>
+        </p:spPr>
+        <p:txBody>
+          <a:bodyPr vert="horz" lIns="91440" tIns="45720" rIns="91440" bIns="45720" rtlCol="0"/>
+          <a:lstStyle/>
+          <a:p>
+            <a:pPr lvl="0"/>
+            <a:r>
+              <a:rPr lang="en-US"/>
+              <a:t>Click to edit Master text styles</a:t>
+            </a:r>
+          </a:p>
+          <a:p>
+            <a:pPr lvl="1"/>
+            <a:r>
+              <a:rPr lang="en-US"/>
+              <a:t>Second level</a:t>
+            </a:r>
+          </a:p>
+          <a:p>
+            <a:pPr lvl="2"/>
+            <a:r>
+              <a:rPr lang="en-US"/>
+              <a:t>Third level</a:t>
+            </a:r>
+          </a:p>
+          <a:p>
+            <a:pPr lvl="3"/>
+            <a:r>
+              <a:rPr lang="en-US"/>
+              <a:t>Fourth level</a:t>
+            </a:r>
+          </a:p>
+          <a:p>
+            <a:pPr lvl="4"/>
+            <a:r>
+              <a:rPr lang="en-US"/>
+              <a:t>Fifth level</a:t>
+            </a:r>
+          </a:p>
+        </p:txBody>
+      </p:sp>
+      <p:sp>
+        <p:nvSpPr>
+          <p:cNvPr id="6" name="Footer Placeholder 5"/>
+          <p:cNvSpPr>
+            <a:spLocks noGrp="1"/>
+          </p:cNvSpPr>
+          <p:nvPr>
+            <p:ph type="ftr" sz="quarter" idx="4"/>
+          </p:nvPr>
+        </p:nvSpPr>
+        <p:spPr>
+          <a:xfrm>
+            <a:off x="0" y="8685213"/>
+            <a:ext cx="2971800" cy="458787"/>
+          </a:xfrm>
+          <a:prstGeom prst="rect">
+            <a:avLst/>
+          </a:prstGeom>
+        </p:spPr>
+        <p:txBody>
+          <a:bodyPr vert="horz" lIns="91440" tIns="45720" rIns="91440" bIns="45720" rtlCol="0" anchor="b"/>
+          <a:lstStyle>
+            <a:lvl1pPr algn="l">
+              <a:defRPr sz="1200"/>
+            </a:lvl1pPr>
+          </a:lstStyle>
+          <a:p>
+            <a:endParaRPr lang="en-US"/>
+          </a:p>
+        </p:txBody>
+      </p:sp>
+      <p:sp>
+        <p:nvSpPr>
+          <p:cNvPr id="7" name="Slide Number Placeholder 6"/>
+          <p:cNvSpPr>
+            <a:spLocks noGrp="1"/>
+          </p:cNvSpPr>
+          <p:nvPr>
+            <p:ph type="sldNum" sz="quarter" idx="5"/>
+          </p:nvPr>
+        </p:nvSpPr>
+        <p:spPr>
+          <a:xfrm>
+            <a:off x="3884613" y="8685213"/>
+            <a:ext cx="2971800" cy="458787"/>
+          </a:xfrm>
+          <a:prstGeom prst="rect">
+            <a:avLst/>
+          </a:prstGeom>
+        </p:spPr>
+        <p:txBody>
+          <a:bodyPr vert="horz" lIns="91440" tIns="45720" rIns="91440" bIns="45720" rtlCol="0" anchor="b"/>
+          <a:lstStyle>
+            <a:lvl1pPr algn="r">
+              <a:defRPr sz="1200"/>
+            </a:lvl1pPr>
+          </a:lstStyle>
+          <a:p>
+            <a:fld id="{BF48E62D-73DF-CA4D-B524-D698C564174E}" type="slidenum">
+              <a:rPr lang="en-US" smtClean="0"/>
+              <a:t>‹#›</a:t>
+            </a:fld>
+            <a:endParaRPr lang="en-US"/>
+          </a:p>
+        </p:txBody>
+      </p:sp>
+    </p:spTree>
+    <p:extLst>
+      <p:ext uri="{BB962C8B-B14F-4D97-AF65-F5344CB8AC3E}">
+        <p14:creationId xmlns:p14="http://schemas.microsoft.com/office/powerpoint/2010/main" val="1750352617"/>
+      </p:ext>
+    </p:extLst>
+  </p:cSld>
+  <p:clrMap bg1="lt1" tx1="dk1" bg2="lt2" tx2="dk2" accent1="accent1" accent2="accent2" accent3="accent3" accent4="accent4" accent5="accent5" accent6="accent6" hlink="hlink" folHlink="folHlink"/>
+  <p:notesStyle>
+    <a:lvl1pPr marL="0" algn="l" defTabSz="914400" rtl="0" eaLnBrk="1" latinLnBrk="0" hangingPunct="1">
+      <a:defRPr sz="1200" kern="1200">
+        <a:solidFill>
+          <a:schemeClr val="tx1"/>
+        </a:solidFill>
+        <a:latin typeface="+mn-lt"/>
+        <a:ea typeface="+mn-ea"/>
+        <a:cs typeface="+mn-cs"/>
+      </a:defRPr>
+    </a:lvl1pPr>
+    <a:lvl2pPr marL="457200" algn="l" defTabSz="914400" rtl="0" eaLnBrk="1" latinLnBrk="0" hangingPunct="1">
+      <a:defRPr sz="1200" kern="1200">
+        <a:solidFill>
+          <a:schemeClr val="tx1"/>
+        </a:solidFill>
+        <a:latin typeface="+mn-lt"/>
+        <a:ea typeface="+mn-ea"/>
+        <a:cs typeface="+mn-cs"/>
+      </a:defRPr>
+    </a:lvl2pPr>
+    <a:lvl3pPr marL="914400" algn="l" defTabSz="914400" rtl="0" eaLnBrk="1" latinLnBrk="0" hangingPunct="1">
+      <a:defRPr sz="1200" kern="1200">
+        <a:solidFill>
+          <a:schemeClr val="tx1"/>
+        </a:solidFill>
+        <a:latin typeface="+mn-lt"/>
+        <a:ea typeface="+mn-ea"/>
+        <a:cs typeface="+mn-cs"/>
+      </a:defRPr>
+    </a:lvl3pPr>
+    <a:lvl4pPr marL="1371600" algn="l" defTabSz="914400" rtl="0" eaLnBrk="1" latinLnBrk="0" hangingPunct="1">
+      <a:defRPr sz="1200" kern="1200">
+        <a:solidFill>
+          <a:schemeClr val="tx1"/>
+        </a:solidFill>
+        <a:latin typeface="+mn-lt"/>
+        <a:ea typeface="+mn-ea"/>
+        <a:cs typeface="+mn-cs"/>
+      </a:defRPr>
+    </a:lvl4pPr>
+    <a:lvl5pPr marL="1828800" algn="l" defTabSz="914400" rtl="0" eaLnBrk="1" latinLnBrk="0" hangingPunct="1">
+      <a:defRPr sz="1200" kern="1200">
+        <a:solidFill>
+          <a:schemeClr val="tx1"/>
+        </a:solidFill>
+        <a:latin typeface="+mn-lt"/>
+        <a:ea typeface="+mn-ea"/>
+        <a:cs typeface="+mn-cs"/>
+      </a:defRPr>
+    </a:lvl5pPr>
+    <a:lvl6pPr marL="2286000" algn="l" defTabSz="914400" rtl="0" eaLnBrk="1" latinLnBrk="0" hangingPunct="1">
+      <a:defRPr sz="1200" kern="1200">
+        <a:solidFill>
+          <a:schemeClr val="tx1"/>
+        </a:solidFill>
+        <a:latin typeface="+mn-lt"/>
+        <a:ea typeface="+mn-ea"/>
+        <a:cs typeface="+mn-cs"/>
+      </a:defRPr>
+    </a:lvl6pPr>
+    <a:lvl7pPr marL="2743200" algn="l" defTabSz="914400" rtl="0" eaLnBrk="1" latinLnBrk="0" hangingPunct="1">
+      <a:defRPr sz="1200" kern="1200">
+        <a:solidFill>
+          <a:schemeClr val="tx1"/>
+        </a:solidFill>
+        <a:latin typeface="+mn-lt"/>
+        <a:ea typeface="+mn-ea"/>
+        <a:cs typeface="+mn-cs"/>
+      </a:defRPr>
+    </a:lvl7pPr>
+    <a:lvl8pPr marL="3200400" algn="l" defTabSz="914400" rtl="0" eaLnBrk="1" latinLnBrk="0" hangingPunct="1">
+      <a:defRPr sz="1200" kern="1200">
+        <a:solidFill>
+          <a:schemeClr val="tx1"/>
+        </a:solidFill>
+        <a:latin typeface="+mn-lt"/>
+        <a:ea typeface="+mn-ea"/>
+        <a:cs typeface="+mn-cs"/>
+      </a:defRPr>
+    </a:lvl8pPr>
+    <a:lvl9pPr marL="3657600" algn="l" defTabSz="914400" rtl="0" eaLnBrk="1" latinLnBrk="0" hangingPunct="1">
+      <a:defRPr sz="1200" kern="1200">
+        <a:solidFill>
+          <a:schemeClr val="tx1"/>
+        </a:solidFill>
+        <a:latin typeface="+mn-lt"/>
+        <a:ea typeface="+mn-ea"/>
+        <a:cs typeface="+mn-cs"/>
+      </a:defRPr>
+    </a:lvl9pPr>
+  </p:notesStyle>
+</p:notesMaster>
+</file>
+
+<file path=ppt/notesSlides/notesSlide1.xml><?xml version="1.0" encoding="utf-8"?>
+<p:notes xmlns:a="http://schemas.openxmlformats.org/drawingml/2006/main" xmlns:r="http://schemas.openxmlformats.org/officeDocument/2006/relationships" xmlns:p="http://schemas.openxmlformats.org/presentationml/2006/main">
+  <p:cSld>
+    <p:spTree>
+      <p:nvGrpSpPr>
+        <p:cNvPr id="1" name=""/>
+        <p:cNvGrpSpPr/>
+        <p:nvPr/>
+      </p:nvGrpSpPr>
+      <p:grpSpPr>
+        <a:xfrm>
+          <a:off x="0" y="0"/>
+          <a:ext cx="0" cy="0"/>
+          <a:chOff x="0" y="0"/>
+          <a:chExt cx="0" cy="0"/>
+        </a:xfrm>
+      </p:grpSpPr>
+      <p:sp>
+        <p:nvSpPr>
+          <p:cNvPr id="2" name="Slide Image Placeholder 1"/>
+          <p:cNvSpPr>
+            <a:spLocks noGrp="1" noRot="1" noChangeAspect="1"/>
+          </p:cNvSpPr>
+          <p:nvPr>
+            <p:ph type="sldImg"/>
+          </p:nvPr>
+        </p:nvSpPr>
+        <p:spPr/>
+      </p:sp>
+      <p:sp>
+        <p:nvSpPr>
+          <p:cNvPr id="3" name="Notes Placeholder 2"/>
+          <p:cNvSpPr>
+            <a:spLocks noGrp="1"/>
+          </p:cNvSpPr>
+          <p:nvPr>
+            <p:ph type="body" idx="1"/>
+          </p:nvPr>
+        </p:nvSpPr>
+        <p:spPr/>
+        <p:txBody>
+          <a:bodyPr/>
+          <a:lstStyle/>
+          <a:p>
+            <a:endParaRPr lang="en-US" dirty="0"/>
+          </a:p>
+        </p:txBody>
+      </p:sp>
+      <p:sp>
+        <p:nvSpPr>
+          <p:cNvPr id="4" name="Slide Number Placeholder 3"/>
+          <p:cNvSpPr>
+            <a:spLocks noGrp="1"/>
+          </p:cNvSpPr>
+          <p:nvPr>
+            <p:ph type="sldNum" sz="quarter" idx="5"/>
+          </p:nvPr>
+        </p:nvSpPr>
+        <p:spPr/>
+        <p:txBody>
+          <a:bodyPr/>
+          <a:lstStyle/>
+          <a:p>
+            <a:fld id="{BF48E62D-73DF-CA4D-B524-D698C564174E}" type="slidenum">
+              <a:rPr lang="en-US" smtClean="0"/>
+              <a:t>3</a:t>
+            </a:fld>
+            <a:endParaRPr lang="en-US"/>
+          </a:p>
+        </p:txBody>
+      </p:sp>
+    </p:spTree>
+    <p:extLst>
+      <p:ext uri="{BB962C8B-B14F-4D97-AF65-F5344CB8AC3E}">
+        <p14:creationId xmlns:p14="http://schemas.microsoft.com/office/powerpoint/2010/main" val="1339205682"/>
+      </p:ext>
+    </p:extLst>
+  </p:cSld>
+  <p:clrMapOvr>
+    <a:masterClrMapping/>
+  </p:clrMapOvr>
+</p:notes>
+</file>
+
 <file path=ppt/slideLayouts/slideLayout1.xml><?xml version="1.0" encoding="utf-8"?>
 <p:sldLayout xmlns:a="http://schemas.openxmlformats.org/drawingml/2006/main" xmlns:r="http://schemas.openxmlformats.org/officeDocument/2006/relationships" xmlns:p="http://schemas.openxmlformats.org/presentationml/2006/main" type="title" preserve="1">
   <p:cSld name="Title Slide">
@@ -268,7 +705,7 @@
           <a:p>
             <a:fld id="{CE4EEE66-3C1A-F640-96BA-2DDC0EDF8D51}" type="datetimeFigureOut">
               <a:rPr lang="en-US" smtClean="0"/>
-              <a:t>3/30/20</a:t>
+              <a:t>4/6/20</a:t>
             </a:fld>
             <a:endParaRPr lang="en-US"/>
           </a:p>
@@ -466,7 +903,7 @@
           <a:p>
             <a:fld id="{CE4EEE66-3C1A-F640-96BA-2DDC0EDF8D51}" type="datetimeFigureOut">
               <a:rPr lang="en-US" smtClean="0"/>
-              <a:t>3/30/20</a:t>
+              <a:t>4/6/20</a:t>
             </a:fld>
             <a:endParaRPr lang="en-US"/>
           </a:p>
@@ -674,7 +1111,7 @@
           <a:p>
             <a:fld id="{CE4EEE66-3C1A-F640-96BA-2DDC0EDF8D51}" type="datetimeFigureOut">
               <a:rPr lang="en-US" smtClean="0"/>
-              <a:t>3/30/20</a:t>
+              <a:t>4/6/20</a:t>
             </a:fld>
             <a:endParaRPr lang="en-US"/>
           </a:p>
@@ -872,7 +1309,7 @@
           <a:p>
             <a:fld id="{CE4EEE66-3C1A-F640-96BA-2DDC0EDF8D51}" type="datetimeFigureOut">
               <a:rPr lang="en-US" smtClean="0"/>
-              <a:t>3/30/20</a:t>
+              <a:t>4/6/20</a:t>
             </a:fld>
             <a:endParaRPr lang="en-US"/>
           </a:p>
@@ -1147,7 +1584,7 @@
           <a:p>
             <a:fld id="{CE4EEE66-3C1A-F640-96BA-2DDC0EDF8D51}" type="datetimeFigureOut">
               <a:rPr lang="en-US" smtClean="0"/>
-              <a:t>3/30/20</a:t>
+              <a:t>4/6/20</a:t>
             </a:fld>
             <a:endParaRPr lang="en-US"/>
           </a:p>
@@ -1412,7 +1849,7 @@
           <a:p>
             <a:fld id="{CE4EEE66-3C1A-F640-96BA-2DDC0EDF8D51}" type="datetimeFigureOut">
               <a:rPr lang="en-US" smtClean="0"/>
-              <a:t>3/30/20</a:t>
+              <a:t>4/6/20</a:t>
             </a:fld>
             <a:endParaRPr lang="en-US"/>
           </a:p>
@@ -1824,7 +2261,7 @@
           <a:p>
             <a:fld id="{CE4EEE66-3C1A-F640-96BA-2DDC0EDF8D51}" type="datetimeFigureOut">
               <a:rPr lang="en-US" smtClean="0"/>
-              <a:t>3/30/20</a:t>
+              <a:t>4/6/20</a:t>
             </a:fld>
             <a:endParaRPr lang="en-US"/>
           </a:p>
@@ -1965,7 +2402,7 @@
           <a:p>
             <a:fld id="{CE4EEE66-3C1A-F640-96BA-2DDC0EDF8D51}" type="datetimeFigureOut">
               <a:rPr lang="en-US" smtClean="0"/>
-              <a:t>3/30/20</a:t>
+              <a:t>4/6/20</a:t>
             </a:fld>
             <a:endParaRPr lang="en-US"/>
           </a:p>
@@ -2078,7 +2515,7 @@
           <a:p>
             <a:fld id="{CE4EEE66-3C1A-F640-96BA-2DDC0EDF8D51}" type="datetimeFigureOut">
               <a:rPr lang="en-US" smtClean="0"/>
-              <a:t>3/30/20</a:t>
+              <a:t>4/6/20</a:t>
             </a:fld>
             <a:endParaRPr lang="en-US"/>
           </a:p>
@@ -2389,7 +2826,7 @@
           <a:p>
             <a:fld id="{CE4EEE66-3C1A-F640-96BA-2DDC0EDF8D51}" type="datetimeFigureOut">
               <a:rPr lang="en-US" smtClean="0"/>
-              <a:t>3/30/20</a:t>
+              <a:t>4/6/20</a:t>
             </a:fld>
             <a:endParaRPr lang="en-US"/>
           </a:p>
@@ -2677,7 +3114,7 @@
           <a:p>
             <a:fld id="{CE4EEE66-3C1A-F640-96BA-2DDC0EDF8D51}" type="datetimeFigureOut">
               <a:rPr lang="en-US" smtClean="0"/>
-              <a:t>3/30/20</a:t>
+              <a:t>4/6/20</a:t>
             </a:fld>
             <a:endParaRPr lang="en-US"/>
           </a:p>
@@ -2918,7 +3355,7 @@
           <a:p>
             <a:fld id="{CE4EEE66-3C1A-F640-96BA-2DDC0EDF8D51}" type="datetimeFigureOut">
               <a:rPr lang="en-US" smtClean="0"/>
-              <a:t>3/30/20</a:t>
+              <a:t>4/6/20</a:t>
             </a:fld>
             <a:endParaRPr lang="en-US"/>
           </a:p>
@@ -3351,13 +3788,20 @@
             <p:ph type="ctrTitle"/>
           </p:nvPr>
         </p:nvSpPr>
-        <p:spPr/>
-        <p:txBody>
-          <a:bodyPr/>
+        <p:spPr>
+          <a:xfrm>
+            <a:off x="1524000" y="713289"/>
+            <a:ext cx="9144000" cy="2387600"/>
+          </a:xfrm>
+        </p:spPr>
+        <p:txBody>
+          <a:bodyPr>
+            <a:normAutofit/>
+          </a:bodyPr>
           <a:lstStyle/>
           <a:p>
             <a:r>
-              <a:rPr lang="en-US" dirty="0"/>
+              <a:rPr lang="en-US" sz="7200" b="1" dirty="0"/>
               <a:t>Introduction to DGL</a:t>
             </a:r>
           </a:p>
@@ -3392,6 +3836,57 @@
           <a:lstStyle/>
           <a:p>
             <a:endParaRPr lang="en-US"/>
+          </a:p>
+        </p:txBody>
+      </p:sp>
+      <p:sp>
+        <p:nvSpPr>
+          <p:cNvPr id="4" name="Subtitle 2">
+            <a:extLst>
+              <a:ext uri="{FF2B5EF4-FFF2-40B4-BE49-F238E27FC236}">
+                <a16:creationId xmlns:a16="http://schemas.microsoft.com/office/drawing/2014/main" id="{FED1406C-424D-4147-8627-FC015384FFDB}"/>
+              </a:ext>
+            </a:extLst>
+          </p:cNvPr>
+          <p:cNvSpPr>
+            <a:spLocks noGrp="1"/>
+          </p:cNvSpPr>
+          <p:nvPr>
+            <p:ph type="subTitle" idx="1"/>
+          </p:nvPr>
+        </p:nvSpPr>
+        <p:spPr>
+          <a:xfrm>
+            <a:off x="1524000" y="3602038"/>
+            <a:ext cx="9144000" cy="1655762"/>
+          </a:xfrm>
+        </p:spPr>
+        <p:txBody>
+          <a:bodyPr/>
+          <a:lstStyle/>
+          <a:p>
+            <a:r>
+              <a:rPr lang="en-US" dirty="0"/>
+              <a:t>April Workshop Serial 2</a:t>
+            </a:r>
+          </a:p>
+          <a:p>
+            <a:r>
+              <a:rPr lang="en-US" b="1" dirty="0"/>
+              <a:t>Liu </a:t>
+            </a:r>
+            <a:r>
+              <a:rPr lang="en-US" b="1" dirty="0" err="1"/>
+              <a:t>Xuefeng</a:t>
+            </a:r>
+            <a:endParaRPr lang="en-US" b="1" dirty="0"/>
+          </a:p>
+          <a:p>
+            <a:r>
+              <a:rPr lang="en-US" b="1" dirty="0" err="1"/>
+              <a:t>liuxuefe@amazon.com</a:t>
+            </a:r>
+            <a:endParaRPr lang="en-US" b="1" dirty="0"/>
           </a:p>
         </p:txBody>
       </p:sp>
@@ -3425,176 +3920,12 @@
           <a:chExt cx="0" cy="0"/>
         </a:xfrm>
       </p:grpSpPr>
-      <p:sp>
-        <p:nvSpPr>
-          <p:cNvPr id="2" name="TextBox 1">
-            <a:extLst>
-              <a:ext uri="{FF2B5EF4-FFF2-40B4-BE49-F238E27FC236}">
-                <a16:creationId xmlns:a16="http://schemas.microsoft.com/office/drawing/2014/main" id="{94F50C23-ADBA-1441-AFEE-E12B8E8E3390}"/>
-              </a:ext>
-            </a:extLst>
-          </p:cNvPr>
-          <p:cNvSpPr txBox="1"/>
-          <p:nvPr/>
-        </p:nvSpPr>
-        <p:spPr>
-          <a:xfrm>
-            <a:off x="977031" y="513567"/>
-            <a:ext cx="6109570" cy="5293757"/>
-          </a:xfrm>
-          <a:prstGeom prst="rect">
-            <a:avLst/>
-          </a:prstGeom>
-          <a:noFill/>
-        </p:spPr>
-        <p:txBody>
-          <a:bodyPr wrap="square" rtlCol="0">
-            <a:spAutoFit/>
-          </a:bodyPr>
-          <a:lstStyle/>
-          <a:p>
-            <a:endParaRPr lang="en-US" dirty="0"/>
-          </a:p>
-          <a:p>
-            <a:r>
-              <a:rPr lang="en-US" sz="3200" dirty="0"/>
-              <a:t>When you are a domain expert</a:t>
-            </a:r>
-          </a:p>
-          <a:p>
-            <a:endParaRPr lang="en-US" dirty="0"/>
-          </a:p>
-          <a:p>
-            <a:pPr marL="285750" indent="-285750">
-              <a:buFont typeface="Arial" panose="020B0604020202020204" pitchFamily="34" charset="0"/>
-              <a:buChar char="•"/>
-            </a:pPr>
-            <a:r>
-              <a:rPr lang="en-US" dirty="0"/>
-              <a:t>DGL provides domain apps to ease its usage in some specific domains.</a:t>
-            </a:r>
-          </a:p>
-          <a:p>
-            <a:endParaRPr lang="en-US" dirty="0"/>
-          </a:p>
-          <a:p>
-            <a:pPr marL="742950" lvl="1" indent="-285750">
-              <a:buFont typeface="Courier New" panose="02070309020205020404" pitchFamily="49" charset="0"/>
-              <a:buChar char="o"/>
-            </a:pPr>
-            <a:r>
-              <a:rPr lang="en-US" dirty="0"/>
-              <a:t>DGL-</a:t>
-            </a:r>
-            <a:r>
-              <a:rPr lang="en-US" dirty="0" err="1"/>
-              <a:t>LifeSci</a:t>
-            </a:r>
-            <a:r>
-              <a:rPr lang="en-US" dirty="0"/>
-              <a:t> for drug discovery, molecular representation.. </a:t>
-            </a:r>
-          </a:p>
-          <a:p>
-            <a:pPr marL="742950" lvl="1" indent="-285750">
-              <a:buFont typeface="Courier New" panose="02070309020205020404" pitchFamily="49" charset="0"/>
-              <a:buChar char="o"/>
-            </a:pPr>
-            <a:r>
-              <a:rPr lang="en-US" dirty="0"/>
-              <a:t>DGL-KE for knowledge graph.</a:t>
-            </a:r>
-          </a:p>
-          <a:p>
-            <a:pPr marL="742950" lvl="1" indent="-285750">
-              <a:buFont typeface="Courier New" panose="02070309020205020404" pitchFamily="49" charset="0"/>
-              <a:buChar char="o"/>
-            </a:pPr>
-            <a:r>
-              <a:rPr lang="en-US" dirty="0"/>
-              <a:t>DGL-</a:t>
-            </a:r>
-            <a:r>
-              <a:rPr lang="en-US" dirty="0" err="1"/>
-              <a:t>RecSys</a:t>
-            </a:r>
-            <a:r>
-              <a:rPr lang="en-US" dirty="0"/>
-              <a:t> for recommend system. </a:t>
-            </a:r>
-          </a:p>
-          <a:p>
-            <a:pPr marL="285750" indent="-285750">
-              <a:buFont typeface="Arial" panose="020B0604020202020204" pitchFamily="34" charset="0"/>
-              <a:buChar char="•"/>
-            </a:pPr>
-            <a:endParaRPr lang="en-US" dirty="0"/>
-          </a:p>
-          <a:p>
-            <a:pPr marL="285750" indent="-285750">
-              <a:buFont typeface="Arial" panose="020B0604020202020204" pitchFamily="34" charset="0"/>
-              <a:buChar char="•"/>
-            </a:pPr>
-            <a:r>
-              <a:rPr lang="en-US" dirty="0"/>
-              <a:t>With DGL domain apps, training a knowledge graph with multiple GPU only needs a console command.</a:t>
-            </a:r>
-          </a:p>
-          <a:p>
-            <a:pPr marL="285750" indent="-285750">
-              <a:buFont typeface="Arial" panose="020B0604020202020204" pitchFamily="34" charset="0"/>
-              <a:buChar char="•"/>
-            </a:pPr>
-            <a:endParaRPr lang="en-US" dirty="0"/>
-          </a:p>
-          <a:p>
-            <a:pPr marL="285750" indent="-285750">
-              <a:buFont typeface="Arial" panose="020B0604020202020204" pitchFamily="34" charset="0"/>
-              <a:buChar char="•"/>
-            </a:pPr>
-            <a:r>
-              <a:rPr lang="en-US" dirty="0"/>
-              <a:t>It supports a rich and powerful configuration.</a:t>
-            </a:r>
-          </a:p>
-          <a:p>
-            <a:pPr marL="742950" lvl="1" indent="-285750">
-              <a:buFont typeface="Courier New" panose="02070309020205020404" pitchFamily="49" charset="0"/>
-              <a:buChar char="o"/>
-            </a:pPr>
-            <a:r>
-              <a:rPr lang="en-US" dirty="0"/>
-              <a:t>Key hyper parameter setting.</a:t>
-            </a:r>
-          </a:p>
-          <a:p>
-            <a:pPr marL="742950" lvl="1" indent="-285750">
-              <a:buFont typeface="Courier New" panose="02070309020205020404" pitchFamily="49" charset="0"/>
-              <a:buChar char="o"/>
-            </a:pPr>
-            <a:r>
-              <a:rPr lang="en-US" dirty="0"/>
-              <a:t>Multi-GPU training.</a:t>
-            </a:r>
-          </a:p>
-          <a:p>
-            <a:pPr marL="742950" lvl="1" indent="-285750">
-              <a:buFont typeface="Courier New" panose="02070309020205020404" pitchFamily="49" charset="0"/>
-              <a:buChar char="o"/>
-            </a:pPr>
-            <a:r>
-              <a:rPr lang="en-US" dirty="0"/>
-              <a:t>Multi-node training.</a:t>
-            </a:r>
-          </a:p>
-        </p:txBody>
-      </p:sp>
       <p:pic>
         <p:nvPicPr>
-          <p:cNvPr id="3" name="Picture 2">
-            <a:extLst>
-              <a:ext uri="{FF2B5EF4-FFF2-40B4-BE49-F238E27FC236}">
-                <a16:creationId xmlns:a16="http://schemas.microsoft.com/office/drawing/2014/main" id="{132CE0A6-B772-9F4C-AC13-EB81AD16BFF3}"/>
+          <p:cNvPr id="6" name="Picture 5">
+            <a:extLst>
+              <a:ext uri="{FF2B5EF4-FFF2-40B4-BE49-F238E27FC236}">
+                <a16:creationId xmlns:a16="http://schemas.microsoft.com/office/drawing/2014/main" id="{32DBFEDF-E18D-4347-9542-F2E0C8A53B6C}"/>
               </a:ext>
             </a:extLst>
           </p:cNvPr>
@@ -3610,7 +3941,7 @@
         </p:blipFill>
         <p:spPr>
           <a:xfrm>
-            <a:off x="7395411" y="1563768"/>
+            <a:off x="7423486" y="1353335"/>
             <a:ext cx="4660231" cy="3441700"/>
           </a:xfrm>
           <a:prstGeom prst="rect">
@@ -3623,10 +3954,351 @@
           </a:ln>
         </p:spPr>
       </p:pic>
+      <p:sp>
+        <p:nvSpPr>
+          <p:cNvPr id="2" name="TextBox 1">
+            <a:extLst>
+              <a:ext uri="{FF2B5EF4-FFF2-40B4-BE49-F238E27FC236}">
+                <a16:creationId xmlns:a16="http://schemas.microsoft.com/office/drawing/2014/main" id="{94F50C23-ADBA-1441-AFEE-E12B8E8E3390}"/>
+              </a:ext>
+            </a:extLst>
+          </p:cNvPr>
+          <p:cNvSpPr txBox="1"/>
+          <p:nvPr/>
+        </p:nvSpPr>
+        <p:spPr>
+          <a:xfrm>
+            <a:off x="977031" y="513567"/>
+            <a:ext cx="6446455" cy="5570756"/>
+          </a:xfrm>
+          <a:prstGeom prst="rect">
+            <a:avLst/>
+          </a:prstGeom>
+          <a:noFill/>
+        </p:spPr>
+        <p:txBody>
+          <a:bodyPr wrap="square" rtlCol="0">
+            <a:spAutoFit/>
+          </a:bodyPr>
+          <a:lstStyle/>
+          <a:p>
+            <a:endParaRPr lang="en-US" dirty="0"/>
+          </a:p>
+          <a:p>
+            <a:r>
+              <a:rPr lang="en-US" sz="3200" dirty="0"/>
+              <a:t>When you are a domain expert</a:t>
+            </a:r>
+          </a:p>
+          <a:p>
+            <a:endParaRPr lang="en-US" dirty="0"/>
+          </a:p>
+          <a:p>
+            <a:pPr marL="285750" indent="-285750">
+              <a:buFont typeface="Arial" panose="020B0604020202020204" pitchFamily="34" charset="0"/>
+              <a:buChar char="•"/>
+            </a:pPr>
+            <a:r>
+              <a:rPr lang="en-US" dirty="0"/>
+              <a:t>DGL provides domain apps to ease its usage in some specific domains.</a:t>
+            </a:r>
+          </a:p>
+          <a:p>
+            <a:endParaRPr lang="en-US" dirty="0"/>
+          </a:p>
+          <a:p>
+            <a:pPr marL="742950" lvl="1" indent="-285750">
+              <a:buFont typeface="Courier New" panose="02070309020205020404" pitchFamily="49" charset="0"/>
+              <a:buChar char="o"/>
+            </a:pPr>
+            <a:r>
+              <a:rPr lang="en-US" dirty="0"/>
+              <a:t>DGL-</a:t>
+            </a:r>
+            <a:r>
+              <a:rPr lang="en-US" dirty="0" err="1"/>
+              <a:t>LifeSci</a:t>
+            </a:r>
+            <a:r>
+              <a:rPr lang="en-US" dirty="0"/>
+              <a:t> for drug discovery, molecular representation.. </a:t>
+            </a:r>
+          </a:p>
+          <a:p>
+            <a:pPr marL="742950" lvl="1" indent="-285750">
+              <a:buFont typeface="Courier New" panose="02070309020205020404" pitchFamily="49" charset="0"/>
+              <a:buChar char="o"/>
+            </a:pPr>
+            <a:r>
+              <a:rPr lang="en-US" dirty="0"/>
+              <a:t>DGL-KE for knowledge graph.</a:t>
+            </a:r>
+          </a:p>
+          <a:p>
+            <a:pPr marL="742950" lvl="1" indent="-285750">
+              <a:buFont typeface="Courier New" panose="02070309020205020404" pitchFamily="49" charset="0"/>
+              <a:buChar char="o"/>
+            </a:pPr>
+            <a:r>
+              <a:rPr lang="en-US" dirty="0"/>
+              <a:t>DGL-</a:t>
+            </a:r>
+            <a:r>
+              <a:rPr lang="en-US" dirty="0" err="1"/>
+              <a:t>RecSys</a:t>
+            </a:r>
+            <a:r>
+              <a:rPr lang="en-US" dirty="0"/>
+              <a:t> for recommend system (to come).  </a:t>
+            </a:r>
+          </a:p>
+          <a:p>
+            <a:pPr lvl="1"/>
+            <a:endParaRPr lang="en-US" dirty="0"/>
+          </a:p>
+          <a:p>
+            <a:pPr lvl="1"/>
+            <a:endParaRPr lang="en-US" dirty="0"/>
+          </a:p>
+          <a:p>
+            <a:pPr marL="285750" indent="-285750">
+              <a:buFont typeface="Arial" panose="020B0604020202020204" pitchFamily="34" charset="0"/>
+              <a:buChar char="•"/>
+            </a:pPr>
+            <a:r>
+              <a:rPr lang="en-US" dirty="0"/>
+              <a:t>DGL-KE</a:t>
+            </a:r>
+          </a:p>
+          <a:p>
+            <a:pPr marL="742950" lvl="1" indent="-285750">
+              <a:buFont typeface="Courier New" panose="02070309020205020404" pitchFamily="49" charset="0"/>
+              <a:buChar char="o"/>
+            </a:pPr>
+            <a:r>
+              <a:rPr lang="en-US" dirty="0"/>
+              <a:t>Effortlessly generate knowledge graph embedding with one line of code.</a:t>
+            </a:r>
+          </a:p>
+          <a:p>
+            <a:pPr marL="742950" lvl="1" indent="-285750">
+              <a:buFont typeface="Courier New" panose="02070309020205020404" pitchFamily="49" charset="0"/>
+              <a:buChar char="o"/>
+            </a:pPr>
+            <a:r>
+              <a:rPr lang="en-US" dirty="0"/>
+              <a:t>Support for giant graphs with millions of nodes and edges.</a:t>
+            </a:r>
+          </a:p>
+          <a:p>
+            <a:pPr marL="742950" lvl="1" indent="-285750">
+              <a:buFont typeface="Courier New" panose="02070309020205020404" pitchFamily="49" charset="0"/>
+              <a:buChar char="o"/>
+            </a:pPr>
+            <a:r>
+              <a:rPr lang="en-US" dirty="0"/>
+              <a:t>Support distributed training on a GPU cluster.</a:t>
+            </a:r>
+          </a:p>
+          <a:p>
+            <a:pPr marL="742950" lvl="1" indent="-285750">
+              <a:buFont typeface="Courier New" panose="02070309020205020404" pitchFamily="49" charset="0"/>
+              <a:buChar char="o"/>
+            </a:pPr>
+            <a:r>
+              <a:rPr lang="en-US" dirty="0"/>
+              <a:t>It takes only 30 minutes to train a knowledge graph over 86M nodes and 338M edges on a 4-machine cluster.</a:t>
+            </a:r>
+          </a:p>
+          <a:p>
+            <a:pPr marL="285750" indent="-285750">
+              <a:buFont typeface="Arial" panose="020B0604020202020204" pitchFamily="34" charset="0"/>
+              <a:buChar char="•"/>
+            </a:pPr>
+            <a:endParaRPr lang="en-US" dirty="0"/>
+          </a:p>
+        </p:txBody>
+      </p:sp>
     </p:spTree>
     <p:extLst>
       <p:ext uri="{BB962C8B-B14F-4D97-AF65-F5344CB8AC3E}">
         <p14:creationId xmlns:p14="http://schemas.microsoft.com/office/powerpoint/2010/main" val="4192289324"/>
+      </p:ext>
+    </p:extLst>
+  </p:cSld>
+  <p:clrMapOvr>
+    <a:masterClrMapping/>
+  </p:clrMapOvr>
+</p:sld>
+</file>
+
+<file path=ppt/slides/slide11.xml><?xml version="1.0" encoding="utf-8"?>
+<p:sld xmlns:a="http://schemas.openxmlformats.org/drawingml/2006/main" xmlns:r="http://schemas.openxmlformats.org/officeDocument/2006/relationships" xmlns:p="http://schemas.openxmlformats.org/presentationml/2006/main">
+  <p:cSld>
+    <p:spTree>
+      <p:nvGrpSpPr>
+        <p:cNvPr id="1" name=""/>
+        <p:cNvGrpSpPr/>
+        <p:nvPr/>
+      </p:nvGrpSpPr>
+      <p:grpSpPr>
+        <a:xfrm>
+          <a:off x="0" y="0"/>
+          <a:ext cx="0" cy="0"/>
+          <a:chOff x="0" y="0"/>
+          <a:chExt cx="0" cy="0"/>
+        </a:xfrm>
+      </p:grpSpPr>
+      <p:sp>
+        <p:nvSpPr>
+          <p:cNvPr id="2" name="TextBox 1">
+            <a:extLst>
+              <a:ext uri="{FF2B5EF4-FFF2-40B4-BE49-F238E27FC236}">
+                <a16:creationId xmlns:a16="http://schemas.microsoft.com/office/drawing/2014/main" id="{94F50C23-ADBA-1441-AFEE-E12B8E8E3390}"/>
+              </a:ext>
+            </a:extLst>
+          </p:cNvPr>
+          <p:cNvSpPr txBox="1"/>
+          <p:nvPr/>
+        </p:nvSpPr>
+        <p:spPr>
+          <a:xfrm>
+            <a:off x="977031" y="513567"/>
+            <a:ext cx="7938369" cy="3354765"/>
+          </a:xfrm>
+          <a:prstGeom prst="rect">
+            <a:avLst/>
+          </a:prstGeom>
+          <a:noFill/>
+        </p:spPr>
+        <p:txBody>
+          <a:bodyPr wrap="square" rtlCol="0">
+            <a:spAutoFit/>
+          </a:bodyPr>
+          <a:lstStyle/>
+          <a:p>
+            <a:endParaRPr lang="en-US" dirty="0"/>
+          </a:p>
+          <a:p>
+            <a:r>
+              <a:rPr lang="en-US" sz="3200" dirty="0"/>
+              <a:t>When you are a domain expert</a:t>
+            </a:r>
+            <a:endParaRPr lang="en-US" dirty="0"/>
+          </a:p>
+          <a:p>
+            <a:pPr lvl="1"/>
+            <a:endParaRPr lang="en-US" dirty="0"/>
+          </a:p>
+          <a:p>
+            <a:pPr lvl="1"/>
+            <a:endParaRPr lang="en-US" dirty="0"/>
+          </a:p>
+          <a:p>
+            <a:pPr marL="285750" indent="-285750">
+              <a:buFont typeface="Arial" panose="020B0604020202020204" pitchFamily="34" charset="0"/>
+              <a:buChar char="•"/>
+            </a:pPr>
+            <a:r>
+              <a:rPr lang="en-US" dirty="0"/>
+              <a:t>DGL-</a:t>
+            </a:r>
+            <a:r>
+              <a:rPr lang="en-US" dirty="0" err="1"/>
+              <a:t>LifeSci</a:t>
+            </a:r>
+            <a:endParaRPr lang="en-US" dirty="0"/>
+          </a:p>
+          <a:p>
+            <a:pPr marL="742950" lvl="1" indent="-285750">
+              <a:buFont typeface="Courier New" panose="02070309020205020404" pitchFamily="49" charset="0"/>
+              <a:buChar char="o"/>
+            </a:pPr>
+            <a:r>
+              <a:rPr lang="en-US" dirty="0"/>
+              <a:t>Training scripts and pre-trained models for various applications — molecular property prediction, generative models, and reaction prediction.</a:t>
+            </a:r>
+          </a:p>
+          <a:p>
+            <a:pPr marL="742950" lvl="1" indent="-285750">
+              <a:buFont typeface="Courier New" panose="02070309020205020404" pitchFamily="49" charset="0"/>
+              <a:buChar char="o"/>
+            </a:pPr>
+            <a:r>
+              <a:rPr lang="en-US" dirty="0"/>
+              <a:t>Up to 5.5x model training speedup compared to previous implementations.</a:t>
+            </a:r>
+          </a:p>
+          <a:p>
+            <a:pPr marL="742950" lvl="1" indent="-285750">
+              <a:buFont typeface="Courier New" panose="02070309020205020404" pitchFamily="49" charset="0"/>
+              <a:buChar char="o"/>
+            </a:pPr>
+            <a:r>
+              <a:rPr lang="en-US" dirty="0"/>
+              <a:t>Well defined pipelines for data processing, model construction and evaluation.</a:t>
+            </a:r>
+          </a:p>
+          <a:p>
+            <a:pPr marL="285750" indent="-285750">
+              <a:buFont typeface="Arial" panose="020B0604020202020204" pitchFamily="34" charset="0"/>
+              <a:buChar char="•"/>
+            </a:pPr>
+            <a:endParaRPr lang="en-US" dirty="0"/>
+          </a:p>
+        </p:txBody>
+      </p:sp>
+      <p:pic>
+        <p:nvPicPr>
+          <p:cNvPr id="1026" name="Picture 2">
+            <a:extLst>
+              <a:ext uri="{FF2B5EF4-FFF2-40B4-BE49-F238E27FC236}">
+                <a16:creationId xmlns:a16="http://schemas.microsoft.com/office/drawing/2014/main" id="{23C5C572-C0AE-8A45-AF3A-A34C89DCCB01}"/>
+              </a:ext>
+            </a:extLst>
+          </p:cNvPr>
+          <p:cNvPicPr>
+            <a:picLocks noChangeAspect="1" noChangeArrowheads="1"/>
+          </p:cNvPicPr>
+          <p:nvPr/>
+        </p:nvPicPr>
+        <p:blipFill>
+          <a:blip r:embed="rId2">
+            <a:extLst>
+              <a:ext uri="{28A0092B-C50C-407E-A947-70E740481C1C}">
+                <a14:useLocalDpi xmlns:a14="http://schemas.microsoft.com/office/drawing/2010/main" val="0"/>
+              </a:ext>
+            </a:extLst>
+          </a:blip>
+          <a:srcRect/>
+          <a:stretch>
+            <a:fillRect/>
+          </a:stretch>
+        </p:blipFill>
+        <p:spPr bwMode="auto">
+          <a:xfrm>
+            <a:off x="977031" y="3868332"/>
+            <a:ext cx="9545052" cy="1710155"/>
+          </a:xfrm>
+          <a:prstGeom prst="rect">
+            <a:avLst/>
+          </a:prstGeom>
+          <a:noFill/>
+          <a:extLst>
+            <a:ext uri="{909E8E84-426E-40DD-AFC4-6F175D3DCCD1}">
+              <a14:hiddenFill xmlns:a14="http://schemas.microsoft.com/office/drawing/2010/main">
+                <a:solidFill>
+                  <a:srgbClr val="FFFFFF"/>
+                </a:solidFill>
+              </a14:hiddenFill>
+            </a:ext>
+          </a:extLst>
+        </p:spPr>
+      </p:pic>
+    </p:spTree>
+    <p:extLst>
+      <p:ext uri="{BB962C8B-B14F-4D97-AF65-F5344CB8AC3E}">
+        <p14:creationId xmlns:p14="http://schemas.microsoft.com/office/powerpoint/2010/main" val="1460673483"/>
       </p:ext>
     </p:extLst>
   </p:cSld>
@@ -3696,7 +4368,7 @@
             </a:pPr>
             <a:r>
               <a:rPr lang="en-US" dirty="0"/>
-              <a:t>DGL is an easy-to-use, high performance and scalable Python package for deep learning on graphs. </a:t>
+              <a:t>DGL (Deep Graph Library) is an easy-to-use, high performance and scalable Python package for deep learning on graphs. </a:t>
             </a:r>
           </a:p>
           <a:p>
@@ -3933,7 +4605,7 @@
           <p:nvPr/>
         </p:nvPicPr>
         <p:blipFill rotWithShape="1">
-          <a:blip r:embed="rId2"/>
+          <a:blip r:embed="rId3"/>
           <a:srcRect b="61955"/>
           <a:stretch/>
         </p:blipFill>
@@ -3962,7 +4634,7 @@
           <p:nvPr/>
         </p:nvPicPr>
         <p:blipFill>
-          <a:blip r:embed="rId3"/>
+          <a:blip r:embed="rId4"/>
           <a:stretch>
             <a:fillRect/>
           </a:stretch>
@@ -3992,7 +4664,7 @@
           <p:nvPr/>
         </p:nvPicPr>
         <p:blipFill rotWithShape="1">
-          <a:blip r:embed="rId4"/>
+          <a:blip r:embed="rId5"/>
           <a:srcRect b="51845"/>
           <a:stretch/>
         </p:blipFill>
@@ -4016,126 +4688,6 @@
   <p:clrMapOvr>
     <a:masterClrMapping/>
   </p:clrMapOvr>
-  <p:timing>
-    <p:tnLst>
-      <p:par>
-        <p:cTn id="1" dur="indefinite" restart="never" nodeType="tmRoot">
-          <p:childTnLst>
-            <p:seq concurrent="1" nextAc="seek">
-              <p:cTn id="2" dur="indefinite" nodeType="mainSeq">
-                <p:childTnLst>
-                  <p:par>
-                    <p:cTn id="3" fill="hold">
-                      <p:stCondLst>
-                        <p:cond delay="indefinite"/>
-                      </p:stCondLst>
-                      <p:childTnLst>
-                        <p:par>
-                          <p:cTn id="4" fill="hold">
-                            <p:stCondLst>
-                              <p:cond delay="0"/>
-                            </p:stCondLst>
-                            <p:childTnLst>
-                              <p:par>
-                                <p:cTn id="5" presetID="1" presetClass="entr" presetSubtype="0" fill="hold" nodeType="clickEffect">
-                                  <p:stCondLst>
-                                    <p:cond delay="0"/>
-                                  </p:stCondLst>
-                                  <p:childTnLst>
-                                    <p:set>
-                                      <p:cBhvr>
-                                        <p:cTn id="6" dur="1" fill="hold">
-                                          <p:stCondLst>
-                                            <p:cond delay="0"/>
-                                          </p:stCondLst>
-                                        </p:cTn>
-                                        <p:tgtEl>
-                                          <p:spTgt spid="5"/>
-                                        </p:tgtEl>
-                                        <p:attrNameLst>
-                                          <p:attrName>style.visibility</p:attrName>
-                                        </p:attrNameLst>
-                                      </p:cBhvr>
-                                      <p:to>
-                                        <p:strVal val="visible"/>
-                                      </p:to>
-                                    </p:set>
-                                  </p:childTnLst>
-                                </p:cTn>
-                              </p:par>
-                            </p:childTnLst>
-                          </p:cTn>
-                        </p:par>
-                      </p:childTnLst>
-                    </p:cTn>
-                  </p:par>
-                  <p:par>
-                    <p:cTn id="7" fill="hold">
-                      <p:stCondLst>
-                        <p:cond delay="indefinite"/>
-                      </p:stCondLst>
-                      <p:childTnLst>
-                        <p:par>
-                          <p:cTn id="8" fill="hold">
-                            <p:stCondLst>
-                              <p:cond delay="0"/>
-                            </p:stCondLst>
-                            <p:childTnLst>
-                              <p:par>
-                                <p:cTn id="9" presetID="1" presetClass="entr" presetSubtype="0" fill="hold" nodeType="clickEffect">
-                                  <p:stCondLst>
-                                    <p:cond delay="0"/>
-                                  </p:stCondLst>
-                                  <p:childTnLst>
-                                    <p:set>
-                                      <p:cBhvr>
-                                        <p:cTn id="10" dur="1" fill="hold">
-                                          <p:stCondLst>
-                                            <p:cond delay="0"/>
-                                          </p:stCondLst>
-                                        </p:cTn>
-                                        <p:tgtEl>
-                                          <p:spTgt spid="6"/>
-                                        </p:tgtEl>
-                                        <p:attrNameLst>
-                                          <p:attrName>style.visibility</p:attrName>
-                                        </p:attrNameLst>
-                                      </p:cBhvr>
-                                      <p:to>
-                                        <p:strVal val="visible"/>
-                                      </p:to>
-                                    </p:set>
-                                  </p:childTnLst>
-                                </p:cTn>
-                              </p:par>
-                            </p:childTnLst>
-                          </p:cTn>
-                        </p:par>
-                      </p:childTnLst>
-                    </p:cTn>
-                  </p:par>
-                </p:childTnLst>
-              </p:cTn>
-              <p:prevCondLst>
-                <p:cond evt="onPrev" delay="0">
-                  <p:tgtEl>
-                    <p:sldTgt/>
-                  </p:tgtEl>
-                </p:cond>
-              </p:prevCondLst>
-              <p:nextCondLst>
-                <p:cond evt="onNext" delay="0">
-                  <p:tgtEl>
-                    <p:sldTgt/>
-                  </p:tgtEl>
-                </p:cond>
-              </p:nextCondLst>
-            </p:seq>
-          </p:childTnLst>
-        </p:cTn>
-      </p:par>
-    </p:tnLst>
-  </p:timing>
 </p:sld>
 </file>
 
@@ -4433,7 +4985,15 @@
             </a:pPr>
             <a:r>
               <a:rPr lang="en-US" b="1" dirty="0"/>
-              <a:t>I focused on a domain area.</a:t>
+              <a:t>I </a:t>
+            </a:r>
+            <a:r>
+              <a:rPr lang="en-US" b="1" dirty="0" err="1"/>
+              <a:t>focuse</a:t>
+            </a:r>
+            <a:r>
+              <a:rPr lang="en-US" b="1" dirty="0"/>
+              <a:t> on a domain area.</a:t>
             </a:r>
           </a:p>
           <a:p>
@@ -4912,7 +5472,7 @@
             </a:pPr>
             <a:r>
               <a:rPr lang="en-US" dirty="0"/>
-              <a:t>As GNN draws more attentions recent years, a lot algorithms are proposed and some of them are proven to be effective in real world problem solving.</a:t>
+              <a:t>As GNN draws more attentions in recent years, a lot algorithms are proposed and some of them are proven to be effective in real world problem solving.</a:t>
             </a:r>
           </a:p>
           <a:p>
@@ -5090,35 +5650,6 @@
           </a:p>
         </p:txBody>
       </p:sp>
-      <p:pic>
-        <p:nvPicPr>
-          <p:cNvPr id="7" name="Picture 6">
-            <a:extLst>
-              <a:ext uri="{FF2B5EF4-FFF2-40B4-BE49-F238E27FC236}">
-                <a16:creationId xmlns:a16="http://schemas.microsoft.com/office/drawing/2014/main" id="{83BBCCCD-EDF2-AC43-9BB3-C0A0A94B3581}"/>
-              </a:ext>
-            </a:extLst>
-          </p:cNvPr>
-          <p:cNvPicPr>
-            <a:picLocks noChangeAspect="1"/>
-          </p:cNvPicPr>
-          <p:nvPr/>
-        </p:nvPicPr>
-        <p:blipFill rotWithShape="1">
-          <a:blip r:embed="rId3"/>
-          <a:srcRect t="13661" r="18102" b="37013"/>
-          <a:stretch/>
-        </p:blipFill>
-        <p:spPr>
-          <a:xfrm>
-            <a:off x="7515727" y="5684220"/>
-            <a:ext cx="4118810" cy="757989"/>
-          </a:xfrm>
-          <a:prstGeom prst="rect">
-            <a:avLst/>
-          </a:prstGeom>
-        </p:spPr>
-      </p:pic>
       <p:pic>
         <p:nvPicPr>
           <p:cNvPr id="2050" name="Picture 2">
@@ -5134,7 +5665,7 @@
           <p:nvPr/>
         </p:nvPicPr>
         <p:blipFill>
-          <a:blip r:embed="rId4">
+          <a:blip r:embed="rId3">
             <a:extLst>
               <a:ext uri="{28A0092B-C50C-407E-A947-70E740481C1C}">
                 <a14:useLocalDpi xmlns:a14="http://schemas.microsoft.com/office/drawing/2010/main" val="0"/>
@@ -5181,7 +5712,7 @@
           <p:nvPr/>
         </p:nvPicPr>
         <p:blipFill>
-          <a:blip r:embed="rId5"/>
+          <a:blip r:embed="rId4"/>
           <a:stretch>
             <a:fillRect/>
           </a:stretch>
@@ -5190,6 +5721,35 @@
           <a:xfrm>
             <a:off x="7630085" y="4608362"/>
             <a:ext cx="3467100" cy="927100"/>
+          </a:xfrm>
+          <a:prstGeom prst="rect">
+            <a:avLst/>
+          </a:prstGeom>
+        </p:spPr>
+      </p:pic>
+      <p:pic>
+        <p:nvPicPr>
+          <p:cNvPr id="5" name="Picture 4">
+            <a:extLst>
+              <a:ext uri="{FF2B5EF4-FFF2-40B4-BE49-F238E27FC236}">
+                <a16:creationId xmlns:a16="http://schemas.microsoft.com/office/drawing/2014/main" id="{8014B486-36DD-354D-806E-6D53867948E2}"/>
+              </a:ext>
+            </a:extLst>
+          </p:cNvPr>
+          <p:cNvPicPr>
+            <a:picLocks noChangeAspect="1"/>
+          </p:cNvPicPr>
+          <p:nvPr/>
+        </p:nvPicPr>
+        <p:blipFill rotWithShape="1">
+          <a:blip r:embed="rId5"/>
+          <a:srcRect l="26886" t="22644" b="40144"/>
+          <a:stretch/>
+        </p:blipFill>
+        <p:spPr>
+          <a:xfrm>
+            <a:off x="7515727" y="5811253"/>
+            <a:ext cx="3853506" cy="415883"/>
           </a:xfrm>
           <a:prstGeom prst="rect">
             <a:avLst/>
@@ -5282,7 +5842,7 @@
             </a:pPr>
             <a:r>
               <a:rPr lang="en-US" dirty="0"/>
-              <a:t>DGL Message passing API is an intuitive way to do it.</a:t>
+              <a:t>DGL message passing API is an intuitive way to do it.</a:t>
             </a:r>
           </a:p>
           <a:p>
@@ -5942,4 +6502,299 @@
     </a:ext>
   </a:extLst>
 </a:theme>
+</file>
+
+<file path=ppt/theme/theme2.xml><?xml version="1.0" encoding="utf-8"?>
+<a:theme xmlns:a="http://schemas.openxmlformats.org/drawingml/2006/main" name="Office Theme">
+  <a:themeElements>
+    <a:clrScheme name="Office">
+      <a:dk1>
+        <a:sysClr val="windowText" lastClr="000000"/>
+      </a:dk1>
+      <a:lt1>
+        <a:sysClr val="window" lastClr="FFFFFF"/>
+      </a:lt1>
+      <a:dk2>
+        <a:srgbClr val="44546A"/>
+      </a:dk2>
+      <a:lt2>
+        <a:srgbClr val="E7E6E6"/>
+      </a:lt2>
+      <a:accent1>
+        <a:srgbClr val="4472C4"/>
+      </a:accent1>
+      <a:accent2>
+        <a:srgbClr val="ED7D31"/>
+      </a:accent2>
+      <a:accent3>
+        <a:srgbClr val="A5A5A5"/>
+      </a:accent3>
+      <a:accent4>
+        <a:srgbClr val="FFC000"/>
+      </a:accent4>
+      <a:accent5>
+        <a:srgbClr val="5B9BD5"/>
+      </a:accent5>
+      <a:accent6>
+        <a:srgbClr val="70AD47"/>
+      </a:accent6>
+      <a:hlink>
+        <a:srgbClr val="0563C1"/>
+      </a:hlink>
+      <a:folHlink>
+        <a:srgbClr val="954F72"/>
+      </a:folHlink>
+    </a:clrScheme>
+    <a:fontScheme name="Office">
+      <a:majorFont>
+        <a:latin typeface="Calibri Light" panose="020F0302020204030204"/>
+        <a:ea typeface=""/>
+        <a:cs typeface=""/>
+        <a:font script="Jpan" typeface="游ゴシック Light"/>
+        <a:font script="Hang" typeface="맑은 고딕"/>
+        <a:font script="Hans" typeface="等线 Light"/>
+        <a:font script="Hant" typeface="新細明體"/>
+        <a:font script="Arab" typeface="Times New Roman"/>
+        <a:font script="Hebr" typeface="Times New Roman"/>
+        <a:font script="Thai" typeface="Angsana New"/>
+        <a:font script="Ethi" typeface="Nyala"/>
+        <a:font script="Beng" typeface="Vrinda"/>
+        <a:font script="Gujr" typeface="Shruti"/>
+        <a:font script="Khmr" typeface="MoolBoran"/>
+        <a:font script="Knda" typeface="Tunga"/>
+        <a:font script="Guru" typeface="Raavi"/>
+        <a:font script="Cans" typeface="Euphemia"/>
+        <a:font script="Cher" typeface="Plantagenet Cherokee"/>
+        <a:font script="Yiii" typeface="Microsoft Yi Baiti"/>
+        <a:font script="Tibt" typeface="Microsoft Himalaya"/>
+        <a:font script="Thaa" typeface="MV Boli"/>
+        <a:font script="Deva" typeface="Mangal"/>
+        <a:font script="Telu" typeface="Gautami"/>
+        <a:font script="Taml" typeface="Latha"/>
+        <a:font script="Syrc" typeface="Estrangelo Edessa"/>
+        <a:font script="Orya" typeface="Kalinga"/>
+        <a:font script="Mlym" typeface="Kartika"/>
+        <a:font script="Laoo" typeface="DokChampa"/>
+        <a:font script="Sinh" typeface="Iskoola Pota"/>
+        <a:font script="Mong" typeface="Mongolian Baiti"/>
+        <a:font script="Viet" typeface="Times New Roman"/>
+        <a:font script="Uigh" typeface="Microsoft Uighur"/>
+        <a:font script="Geor" typeface="Sylfaen"/>
+        <a:font script="Armn" typeface="Arial"/>
+        <a:font script="Bugi" typeface="Leelawadee UI"/>
+        <a:font script="Bopo" typeface="Microsoft JhengHei"/>
+        <a:font script="Java" typeface="Javanese Text"/>
+        <a:font script="Lisu" typeface="Segoe UI"/>
+        <a:font script="Mymr" typeface="Myanmar Text"/>
+        <a:font script="Nkoo" typeface="Ebrima"/>
+        <a:font script="Olck" typeface="Nirmala UI"/>
+        <a:font script="Osma" typeface="Ebrima"/>
+        <a:font script="Phag" typeface="Phagspa"/>
+        <a:font script="Syrn" typeface="Estrangelo Edessa"/>
+        <a:font script="Syrj" typeface="Estrangelo Edessa"/>
+        <a:font script="Syre" typeface="Estrangelo Edessa"/>
+        <a:font script="Sora" typeface="Nirmala UI"/>
+        <a:font script="Tale" typeface="Microsoft Tai Le"/>
+        <a:font script="Talu" typeface="Microsoft New Tai Lue"/>
+        <a:font script="Tfng" typeface="Ebrima"/>
+      </a:majorFont>
+      <a:minorFont>
+        <a:latin typeface="Calibri" panose="020F0502020204030204"/>
+        <a:ea typeface=""/>
+        <a:cs typeface=""/>
+        <a:font script="Jpan" typeface="游ゴシック"/>
+        <a:font script="Hang" typeface="맑은 고딕"/>
+        <a:font script="Hans" typeface="等线"/>
+        <a:font script="Hant" typeface="新細明體"/>
+        <a:font script="Arab" typeface="Arial"/>
+        <a:font script="Hebr" typeface="Arial"/>
+        <a:font script="Thai" typeface="Cordia New"/>
+        <a:font script="Ethi" typeface="Nyala"/>
+        <a:font script="Beng" typeface="Vrinda"/>
+        <a:font script="Gujr" typeface="Shruti"/>
+        <a:font script="Khmr" typeface="DaunPenh"/>
+        <a:font script="Knda" typeface="Tunga"/>
+        <a:font script="Guru" typeface="Raavi"/>
+        <a:font script="Cans" typeface="Euphemia"/>
+        <a:font script="Cher" typeface="Plantagenet Cherokee"/>
+        <a:font script="Yiii" typeface="Microsoft Yi Baiti"/>
+        <a:font script="Tibt" typeface="Microsoft Himalaya"/>
+        <a:font script="Thaa" typeface="MV Boli"/>
+        <a:font script="Deva" typeface="Mangal"/>
+        <a:font script="Telu" typeface="Gautami"/>
+        <a:font script="Taml" typeface="Latha"/>
+        <a:font script="Syrc" typeface="Estrangelo Edessa"/>
+        <a:font script="Orya" typeface="Kalinga"/>
+        <a:font script="Mlym" typeface="Kartika"/>
+        <a:font script="Laoo" typeface="DokChampa"/>
+        <a:font script="Sinh" typeface="Iskoola Pota"/>
+        <a:font script="Mong" typeface="Mongolian Baiti"/>
+        <a:font script="Viet" typeface="Arial"/>
+        <a:font script="Uigh" typeface="Microsoft Uighur"/>
+        <a:font script="Geor" typeface="Sylfaen"/>
+        <a:font script="Armn" typeface="Arial"/>
+        <a:font script="Bugi" typeface="Leelawadee UI"/>
+        <a:font script="Bopo" typeface="Microsoft JhengHei"/>
+        <a:font script="Java" typeface="Javanese Text"/>
+        <a:font script="Lisu" typeface="Segoe UI"/>
+        <a:font script="Mymr" typeface="Myanmar Text"/>
+        <a:font script="Nkoo" typeface="Ebrima"/>
+        <a:font script="Olck" typeface="Nirmala UI"/>
+        <a:font script="Osma" typeface="Ebrima"/>
+        <a:font script="Phag" typeface="Phagspa"/>
+        <a:font script="Syrn" typeface="Estrangelo Edessa"/>
+        <a:font script="Syrj" typeface="Estrangelo Edessa"/>
+        <a:font script="Syre" typeface="Estrangelo Edessa"/>
+        <a:font script="Sora" typeface="Nirmala UI"/>
+        <a:font script="Tale" typeface="Microsoft Tai Le"/>
+        <a:font script="Talu" typeface="Microsoft New Tai Lue"/>
+        <a:font script="Tfng" typeface="Ebrima"/>
+      </a:minorFont>
+    </a:fontScheme>
+    <a:fmtScheme name="Office">
+      <a:fillStyleLst>
+        <a:solidFill>
+          <a:schemeClr val="phClr"/>
+        </a:solidFill>
+        <a:gradFill rotWithShape="1">
+          <a:gsLst>
+            <a:gs pos="0">
+              <a:schemeClr val="phClr">
+                <a:lumMod val="110000"/>
+                <a:satMod val="105000"/>
+                <a:tint val="67000"/>
+              </a:schemeClr>
+            </a:gs>
+            <a:gs pos="50000">
+              <a:schemeClr val="phClr">
+                <a:lumMod val="105000"/>
+                <a:satMod val="103000"/>
+                <a:tint val="73000"/>
+              </a:schemeClr>
+            </a:gs>
+            <a:gs pos="100000">
+              <a:schemeClr val="phClr">
+                <a:lumMod val="105000"/>
+                <a:satMod val="109000"/>
+                <a:tint val="81000"/>
+              </a:schemeClr>
+            </a:gs>
+          </a:gsLst>
+          <a:lin ang="5400000" scaled="0"/>
+        </a:gradFill>
+        <a:gradFill rotWithShape="1">
+          <a:gsLst>
+            <a:gs pos="0">
+              <a:schemeClr val="phClr">
+                <a:satMod val="103000"/>
+                <a:lumMod val="102000"/>
+                <a:tint val="94000"/>
+              </a:schemeClr>
+            </a:gs>
+            <a:gs pos="50000">
+              <a:schemeClr val="phClr">
+                <a:satMod val="110000"/>
+                <a:lumMod val="100000"/>
+                <a:shade val="100000"/>
+              </a:schemeClr>
+            </a:gs>
+            <a:gs pos="100000">
+              <a:schemeClr val="phClr">
+                <a:lumMod val="99000"/>
+                <a:satMod val="120000"/>
+                <a:shade val="78000"/>
+              </a:schemeClr>
+            </a:gs>
+          </a:gsLst>
+          <a:lin ang="5400000" scaled="0"/>
+        </a:gradFill>
+      </a:fillStyleLst>
+      <a:lnStyleLst>
+        <a:ln w="6350" cap="flat" cmpd="sng" algn="ctr">
+          <a:solidFill>
+            <a:schemeClr val="phClr"/>
+          </a:solidFill>
+          <a:prstDash val="solid"/>
+          <a:miter lim="800000"/>
+        </a:ln>
+        <a:ln w="12700" cap="flat" cmpd="sng" algn="ctr">
+          <a:solidFill>
+            <a:schemeClr val="phClr"/>
+          </a:solidFill>
+          <a:prstDash val="solid"/>
+          <a:miter lim="800000"/>
+        </a:ln>
+        <a:ln w="19050" cap="flat" cmpd="sng" algn="ctr">
+          <a:solidFill>
+            <a:schemeClr val="phClr"/>
+          </a:solidFill>
+          <a:prstDash val="solid"/>
+          <a:miter lim="800000"/>
+        </a:ln>
+      </a:lnStyleLst>
+      <a:effectStyleLst>
+        <a:effectStyle>
+          <a:effectLst/>
+        </a:effectStyle>
+        <a:effectStyle>
+          <a:effectLst/>
+        </a:effectStyle>
+        <a:effectStyle>
+          <a:effectLst>
+            <a:outerShdw blurRad="57150" dist="19050" dir="5400000" algn="ctr" rotWithShape="0">
+              <a:srgbClr val="000000">
+                <a:alpha val="63000"/>
+              </a:srgbClr>
+            </a:outerShdw>
+          </a:effectLst>
+        </a:effectStyle>
+      </a:effectStyleLst>
+      <a:bgFillStyleLst>
+        <a:solidFill>
+          <a:schemeClr val="phClr"/>
+        </a:solidFill>
+        <a:solidFill>
+          <a:schemeClr val="phClr">
+            <a:tint val="95000"/>
+            <a:satMod val="170000"/>
+          </a:schemeClr>
+        </a:solidFill>
+        <a:gradFill rotWithShape="1">
+          <a:gsLst>
+            <a:gs pos="0">
+              <a:schemeClr val="phClr">
+                <a:tint val="93000"/>
+                <a:satMod val="150000"/>
+                <a:shade val="98000"/>
+                <a:lumMod val="102000"/>
+              </a:schemeClr>
+            </a:gs>
+            <a:gs pos="50000">
+              <a:schemeClr val="phClr">
+                <a:tint val="98000"/>
+                <a:satMod val="130000"/>
+                <a:shade val="90000"/>
+                <a:lumMod val="103000"/>
+              </a:schemeClr>
+            </a:gs>
+            <a:gs pos="100000">
+              <a:schemeClr val="phClr">
+                <a:shade val="63000"/>
+                <a:satMod val="120000"/>
+              </a:schemeClr>
+            </a:gs>
+          </a:gsLst>
+          <a:lin ang="5400000" scaled="0"/>
+        </a:gradFill>
+      </a:bgFillStyleLst>
+    </a:fmtScheme>
+  </a:themeElements>
+  <a:objectDefaults/>
+  <a:extraClrSchemeLst/>
+  <a:extLst>
+    <a:ext uri="{05A4C25C-085E-4340-85A3-A5531E510DB2}">
+      <thm15:themeFamily xmlns:thm15="http://schemas.microsoft.com/office/thememl/2012/main" name="Office Theme" id="{62F939B6-93AF-4DB8-9C6B-D6C7DFDC589F}" vid="{4A3C46E8-61CC-4603-A589-7422A47A8E4A}"/>
+    </a:ext>
+  </a:extLst>
+</a:theme>
 </file>
</xml_diff>